<commit_message>
added function to convert Covid cluser names into geocodes wiht 3 APIs
</commit_message>
<xml_diff>
--- a/UI.pptx
+++ b/UI.pptx
@@ -107,6 +107,11 @@
       </a:defRPr>
     </a:lvl9pPr>
   </p:defaultTextStyle>
+  <p:extLst>
+    <p:ext uri="{EFAFB233-063F-42B5-8137-9DF3F51BA10A}">
+      <p15:sldGuideLst xmlns:p15="http://schemas.microsoft.com/office/powerpoint/2012/main"/>
+    </p:ext>
+  </p:extLst>
 </p:presentation>
 </file>
 
@@ -257,7 +262,7 @@
           <a:p>
             <a:fld id="{E1B9C67E-C41F-4A49-99AD-51E6378EAB09}" type="datetimeFigureOut">
               <a:rPr lang="en-US" smtClean="0"/>
-              <a:t>9/12/21</a:t>
+              <a:t>9/22/21</a:t>
             </a:fld>
             <a:endParaRPr lang="en-US"/>
           </a:p>
@@ -455,7 +460,7 @@
           <a:p>
             <a:fld id="{E1B9C67E-C41F-4A49-99AD-51E6378EAB09}" type="datetimeFigureOut">
               <a:rPr lang="en-US" smtClean="0"/>
-              <a:t>9/12/21</a:t>
+              <a:t>9/22/21</a:t>
             </a:fld>
             <a:endParaRPr lang="en-US"/>
           </a:p>
@@ -663,7 +668,7 @@
           <a:p>
             <a:fld id="{E1B9C67E-C41F-4A49-99AD-51E6378EAB09}" type="datetimeFigureOut">
               <a:rPr lang="en-US" smtClean="0"/>
-              <a:t>9/12/21</a:t>
+              <a:t>9/22/21</a:t>
             </a:fld>
             <a:endParaRPr lang="en-US"/>
           </a:p>
@@ -861,7 +866,7 @@
           <a:p>
             <a:fld id="{E1B9C67E-C41F-4A49-99AD-51E6378EAB09}" type="datetimeFigureOut">
               <a:rPr lang="en-US" smtClean="0"/>
-              <a:t>9/12/21</a:t>
+              <a:t>9/22/21</a:t>
             </a:fld>
             <a:endParaRPr lang="en-US"/>
           </a:p>
@@ -1136,7 +1141,7 @@
           <a:p>
             <a:fld id="{E1B9C67E-C41F-4A49-99AD-51E6378EAB09}" type="datetimeFigureOut">
               <a:rPr lang="en-US" smtClean="0"/>
-              <a:t>9/12/21</a:t>
+              <a:t>9/22/21</a:t>
             </a:fld>
             <a:endParaRPr lang="en-US"/>
           </a:p>
@@ -1401,7 +1406,7 @@
           <a:p>
             <a:fld id="{E1B9C67E-C41F-4A49-99AD-51E6378EAB09}" type="datetimeFigureOut">
               <a:rPr lang="en-US" smtClean="0"/>
-              <a:t>9/12/21</a:t>
+              <a:t>9/22/21</a:t>
             </a:fld>
             <a:endParaRPr lang="en-US"/>
           </a:p>
@@ -1813,7 +1818,7 @@
           <a:p>
             <a:fld id="{E1B9C67E-C41F-4A49-99AD-51E6378EAB09}" type="datetimeFigureOut">
               <a:rPr lang="en-US" smtClean="0"/>
-              <a:t>9/12/21</a:t>
+              <a:t>9/22/21</a:t>
             </a:fld>
             <a:endParaRPr lang="en-US"/>
           </a:p>
@@ -1954,7 +1959,7 @@
           <a:p>
             <a:fld id="{E1B9C67E-C41F-4A49-99AD-51E6378EAB09}" type="datetimeFigureOut">
               <a:rPr lang="en-US" smtClean="0"/>
-              <a:t>9/12/21</a:t>
+              <a:t>9/22/21</a:t>
             </a:fld>
             <a:endParaRPr lang="en-US"/>
           </a:p>
@@ -2067,7 +2072,7 @@
           <a:p>
             <a:fld id="{E1B9C67E-C41F-4A49-99AD-51E6378EAB09}" type="datetimeFigureOut">
               <a:rPr lang="en-US" smtClean="0"/>
-              <a:t>9/12/21</a:t>
+              <a:t>9/22/21</a:t>
             </a:fld>
             <a:endParaRPr lang="en-US"/>
           </a:p>
@@ -2378,7 +2383,7 @@
           <a:p>
             <a:fld id="{E1B9C67E-C41F-4A49-99AD-51E6378EAB09}" type="datetimeFigureOut">
               <a:rPr lang="en-US" smtClean="0"/>
-              <a:t>9/12/21</a:t>
+              <a:t>9/22/21</a:t>
             </a:fld>
             <a:endParaRPr lang="en-US"/>
           </a:p>
@@ -2666,7 +2671,7 @@
           <a:p>
             <a:fld id="{E1B9C67E-C41F-4A49-99AD-51E6378EAB09}" type="datetimeFigureOut">
               <a:rPr lang="en-US" smtClean="0"/>
-              <a:t>9/12/21</a:t>
+              <a:t>9/22/21</a:t>
             </a:fld>
             <a:endParaRPr lang="en-US"/>
           </a:p>
@@ -2907,7 +2912,7 @@
           <a:p>
             <a:fld id="{E1B9C67E-C41F-4A49-99AD-51E6378EAB09}" type="datetimeFigureOut">
               <a:rPr lang="en-US" smtClean="0"/>
-              <a:t>9/12/21</a:t>
+              <a:t>9/22/21</a:t>
             </a:fld>
             <a:endParaRPr lang="en-US"/>
           </a:p>
@@ -4722,6 +4727,27 @@
               </a:rPr>
               <a:t>https://www.npmjs.com/package/xml-js</a:t>
             </a:r>
+            <a:endParaRPr lang="en-US" dirty="0"/>
+          </a:p>
+          <a:p>
+            <a:r>
+              <a:rPr lang="en-SG" dirty="0"/>
+              <a:t>Ensure that Powered </a:t>
+            </a:r>
+            <a:r>
+              <a:rPr lang="en-SG" dirty="0" err="1"/>
+              <a:t>by</a:t>
+            </a:r>
+            <a:r>
+              <a:rPr lang="en-SG" dirty="0" err="1">
+                <a:hlinkClick r:id="rId4"/>
+              </a:rPr>
+              <a:t>Esri</a:t>
+            </a:r>
+            <a:r>
+              <a:rPr lang="en-SG"/>
+              <a:t> is displayed in the map attribution</a:t>
+            </a:r>
             <a:endParaRPr lang="en-US"/>
           </a:p>
           <a:p>

</xml_diff>

<commit_message>
fixed a bug in cleanseName function for more accurate matching of hotel names
</commit_message>
<xml_diff>
--- a/UI.pptx
+++ b/UI.pptx
@@ -262,7 +262,7 @@
           <a:p>
             <a:fld id="{E1B9C67E-C41F-4A49-99AD-51E6378EAB09}" type="datetimeFigureOut">
               <a:rPr lang="en-US" smtClean="0"/>
-              <a:t>9/22/21</a:t>
+              <a:t>9/26/21</a:t>
             </a:fld>
             <a:endParaRPr lang="en-US"/>
           </a:p>
@@ -460,7 +460,7 @@
           <a:p>
             <a:fld id="{E1B9C67E-C41F-4A49-99AD-51E6378EAB09}" type="datetimeFigureOut">
               <a:rPr lang="en-US" smtClean="0"/>
-              <a:t>9/22/21</a:t>
+              <a:t>9/26/21</a:t>
             </a:fld>
             <a:endParaRPr lang="en-US"/>
           </a:p>
@@ -668,7 +668,7 @@
           <a:p>
             <a:fld id="{E1B9C67E-C41F-4A49-99AD-51E6378EAB09}" type="datetimeFigureOut">
               <a:rPr lang="en-US" smtClean="0"/>
-              <a:t>9/22/21</a:t>
+              <a:t>9/26/21</a:t>
             </a:fld>
             <a:endParaRPr lang="en-US"/>
           </a:p>
@@ -866,7 +866,7 @@
           <a:p>
             <a:fld id="{E1B9C67E-C41F-4A49-99AD-51E6378EAB09}" type="datetimeFigureOut">
               <a:rPr lang="en-US" smtClean="0"/>
-              <a:t>9/22/21</a:t>
+              <a:t>9/26/21</a:t>
             </a:fld>
             <a:endParaRPr lang="en-US"/>
           </a:p>
@@ -1141,7 +1141,7 @@
           <a:p>
             <a:fld id="{E1B9C67E-C41F-4A49-99AD-51E6378EAB09}" type="datetimeFigureOut">
               <a:rPr lang="en-US" smtClean="0"/>
-              <a:t>9/22/21</a:t>
+              <a:t>9/26/21</a:t>
             </a:fld>
             <a:endParaRPr lang="en-US"/>
           </a:p>
@@ -1406,7 +1406,7 @@
           <a:p>
             <a:fld id="{E1B9C67E-C41F-4A49-99AD-51E6378EAB09}" type="datetimeFigureOut">
               <a:rPr lang="en-US" smtClean="0"/>
-              <a:t>9/22/21</a:t>
+              <a:t>9/26/21</a:t>
             </a:fld>
             <a:endParaRPr lang="en-US"/>
           </a:p>
@@ -1818,7 +1818,7 @@
           <a:p>
             <a:fld id="{E1B9C67E-C41F-4A49-99AD-51E6378EAB09}" type="datetimeFigureOut">
               <a:rPr lang="en-US" smtClean="0"/>
-              <a:t>9/22/21</a:t>
+              <a:t>9/26/21</a:t>
             </a:fld>
             <a:endParaRPr lang="en-US"/>
           </a:p>
@@ -1959,7 +1959,7 @@
           <a:p>
             <a:fld id="{E1B9C67E-C41F-4A49-99AD-51E6378EAB09}" type="datetimeFigureOut">
               <a:rPr lang="en-US" smtClean="0"/>
-              <a:t>9/22/21</a:t>
+              <a:t>9/26/21</a:t>
             </a:fld>
             <a:endParaRPr lang="en-US"/>
           </a:p>
@@ -2072,7 +2072,7 @@
           <a:p>
             <a:fld id="{E1B9C67E-C41F-4A49-99AD-51E6378EAB09}" type="datetimeFigureOut">
               <a:rPr lang="en-US" smtClean="0"/>
-              <a:t>9/22/21</a:t>
+              <a:t>9/26/21</a:t>
             </a:fld>
             <a:endParaRPr lang="en-US"/>
           </a:p>
@@ -2383,7 +2383,7 @@
           <a:p>
             <a:fld id="{E1B9C67E-C41F-4A49-99AD-51E6378EAB09}" type="datetimeFigureOut">
               <a:rPr lang="en-US" smtClean="0"/>
-              <a:t>9/22/21</a:t>
+              <a:t>9/26/21</a:t>
             </a:fld>
             <a:endParaRPr lang="en-US"/>
           </a:p>
@@ -2671,7 +2671,7 @@
           <a:p>
             <a:fld id="{E1B9C67E-C41F-4A49-99AD-51E6378EAB09}" type="datetimeFigureOut">
               <a:rPr lang="en-US" smtClean="0"/>
-              <a:t>9/22/21</a:t>
+              <a:t>9/26/21</a:t>
             </a:fld>
             <a:endParaRPr lang="en-US"/>
           </a:p>
@@ -2912,7 +2912,7 @@
           <a:p>
             <a:fld id="{E1B9C67E-C41F-4A49-99AD-51E6378EAB09}" type="datetimeFigureOut">
               <a:rPr lang="en-US" smtClean="0"/>
-              <a:t>9/22/21</a:t>
+              <a:t>9/26/21</a:t>
             </a:fld>
             <a:endParaRPr lang="en-US"/>
           </a:p>
@@ -4745,10 +4745,27 @@
               <a:t>Esri</a:t>
             </a:r>
             <a:r>
-              <a:rPr lang="en-SG"/>
+              <a:rPr lang="en-SG" dirty="0"/>
               <a:t> is displayed in the map attribution</a:t>
             </a:r>
-            <a:endParaRPr lang="en-US"/>
+          </a:p>
+          <a:p>
+            <a:r>
+              <a:rPr lang="en-US" dirty="0">
+                <a:hlinkClick r:id="rId5"/>
+              </a:rPr>
+              <a:t>https://github.com/Esri/esri</a:t>
+            </a:r>
+            <a:r>
+              <a:rPr lang="en-US">
+                <a:hlinkClick r:id="rId5"/>
+              </a:rPr>
+              <a:t>-leaflet-geocoder</a:t>
+            </a:r>
+            <a:r>
+              <a:rPr lang="en-US"/>
+              <a:t> </a:t>
+            </a:r>
           </a:p>
           <a:p>
             <a:endParaRPr lang="en-US" dirty="0"/>

</xml_diff>

<commit_message>
updated readme file and folder
</commit_message>
<xml_diff>
--- a/UI.pptx
+++ b/UI.pptx
@@ -7,8 +7,6 @@
   <p:sldIdLst>
     <p:sldId id="256" r:id="rId2"/>
     <p:sldId id="257" r:id="rId3"/>
-    <p:sldId id="258" r:id="rId4"/>
-    <p:sldId id="259" r:id="rId5"/>
   </p:sldIdLst>
   <p:sldSz cx="12192000" cy="6858000"/>
   <p:notesSz cx="6858000" cy="9144000"/>
@@ -262,7 +260,7 @@
           <a:p>
             <a:fld id="{E1B9C67E-C41F-4A49-99AD-51E6378EAB09}" type="datetimeFigureOut">
               <a:rPr lang="en-US" smtClean="0"/>
-              <a:t>9/26/21</a:t>
+              <a:t>9/27/21</a:t>
             </a:fld>
             <a:endParaRPr lang="en-US"/>
           </a:p>
@@ -460,7 +458,7 @@
           <a:p>
             <a:fld id="{E1B9C67E-C41F-4A49-99AD-51E6378EAB09}" type="datetimeFigureOut">
               <a:rPr lang="en-US" smtClean="0"/>
-              <a:t>9/26/21</a:t>
+              <a:t>9/27/21</a:t>
             </a:fld>
             <a:endParaRPr lang="en-US"/>
           </a:p>
@@ -668,7 +666,7 @@
           <a:p>
             <a:fld id="{E1B9C67E-C41F-4A49-99AD-51E6378EAB09}" type="datetimeFigureOut">
               <a:rPr lang="en-US" smtClean="0"/>
-              <a:t>9/26/21</a:t>
+              <a:t>9/27/21</a:t>
             </a:fld>
             <a:endParaRPr lang="en-US"/>
           </a:p>
@@ -866,7 +864,7 @@
           <a:p>
             <a:fld id="{E1B9C67E-C41F-4A49-99AD-51E6378EAB09}" type="datetimeFigureOut">
               <a:rPr lang="en-US" smtClean="0"/>
-              <a:t>9/26/21</a:t>
+              <a:t>9/27/21</a:t>
             </a:fld>
             <a:endParaRPr lang="en-US"/>
           </a:p>
@@ -1141,7 +1139,7 @@
           <a:p>
             <a:fld id="{E1B9C67E-C41F-4A49-99AD-51E6378EAB09}" type="datetimeFigureOut">
               <a:rPr lang="en-US" smtClean="0"/>
-              <a:t>9/26/21</a:t>
+              <a:t>9/27/21</a:t>
             </a:fld>
             <a:endParaRPr lang="en-US"/>
           </a:p>
@@ -1406,7 +1404,7 @@
           <a:p>
             <a:fld id="{E1B9C67E-C41F-4A49-99AD-51E6378EAB09}" type="datetimeFigureOut">
               <a:rPr lang="en-US" smtClean="0"/>
-              <a:t>9/26/21</a:t>
+              <a:t>9/27/21</a:t>
             </a:fld>
             <a:endParaRPr lang="en-US"/>
           </a:p>
@@ -1818,7 +1816,7 @@
           <a:p>
             <a:fld id="{E1B9C67E-C41F-4A49-99AD-51E6378EAB09}" type="datetimeFigureOut">
               <a:rPr lang="en-US" smtClean="0"/>
-              <a:t>9/26/21</a:t>
+              <a:t>9/27/21</a:t>
             </a:fld>
             <a:endParaRPr lang="en-US"/>
           </a:p>
@@ -1959,7 +1957,7 @@
           <a:p>
             <a:fld id="{E1B9C67E-C41F-4A49-99AD-51E6378EAB09}" type="datetimeFigureOut">
               <a:rPr lang="en-US" smtClean="0"/>
-              <a:t>9/26/21</a:t>
+              <a:t>9/27/21</a:t>
             </a:fld>
             <a:endParaRPr lang="en-US"/>
           </a:p>
@@ -2072,7 +2070,7 @@
           <a:p>
             <a:fld id="{E1B9C67E-C41F-4A49-99AD-51E6378EAB09}" type="datetimeFigureOut">
               <a:rPr lang="en-US" smtClean="0"/>
-              <a:t>9/26/21</a:t>
+              <a:t>9/27/21</a:t>
             </a:fld>
             <a:endParaRPr lang="en-US"/>
           </a:p>
@@ -2383,7 +2381,7 @@
           <a:p>
             <a:fld id="{E1B9C67E-C41F-4A49-99AD-51E6378EAB09}" type="datetimeFigureOut">
               <a:rPr lang="en-US" smtClean="0"/>
-              <a:t>9/26/21</a:t>
+              <a:t>9/27/21</a:t>
             </a:fld>
             <a:endParaRPr lang="en-US"/>
           </a:p>
@@ -2671,7 +2669,7 @@
           <a:p>
             <a:fld id="{E1B9C67E-C41F-4A49-99AD-51E6378EAB09}" type="datetimeFigureOut">
               <a:rPr lang="en-US" smtClean="0"/>
-              <a:t>9/26/21</a:t>
+              <a:t>9/27/21</a:t>
             </a:fld>
             <a:endParaRPr lang="en-US"/>
           </a:p>
@@ -2912,7 +2910,7 @@
           <a:p>
             <a:fld id="{E1B9C67E-C41F-4A49-99AD-51E6378EAB09}" type="datetimeFigureOut">
               <a:rPr lang="en-US" smtClean="0"/>
-              <a:t>9/26/21</a:t>
+              <a:t>9/27/21</a:t>
             </a:fld>
             <a:endParaRPr lang="en-US"/>
           </a:p>
@@ -3329,701 +3327,890 @@
           <a:chExt cx="0" cy="0"/>
         </a:xfrm>
       </p:grpSpPr>
-      <p:sp>
-        <p:nvSpPr>
-          <p:cNvPr id="4" name="Rectangle 3">
-            <a:extLst>
-              <a:ext uri="{FF2B5EF4-FFF2-40B4-BE49-F238E27FC236}">
-                <a16:creationId xmlns:a16="http://schemas.microsoft.com/office/drawing/2014/main" id="{156AA6AB-8247-0749-A51B-BE8F0DE1180E}"/>
-              </a:ext>
-            </a:extLst>
-          </p:cNvPr>
-          <p:cNvSpPr/>
+      <p:grpSp>
+        <p:nvGrpSpPr>
+          <p:cNvPr id="19" name="Group 18">
+            <a:extLst>
+              <a:ext uri="{FF2B5EF4-FFF2-40B4-BE49-F238E27FC236}">
+                <a16:creationId xmlns:a16="http://schemas.microsoft.com/office/drawing/2014/main" id="{136BC1BC-294E-794C-89D9-8127B06DF39A}"/>
+              </a:ext>
+            </a:extLst>
+          </p:cNvPr>
+          <p:cNvGrpSpPr/>
           <p:nvPr/>
-        </p:nvSpPr>
-        <p:spPr>
+        </p:nvGrpSpPr>
+        <p:grpSpPr>
           <a:xfrm>
             <a:off x="120317" y="288759"/>
-            <a:ext cx="4644190" cy="3140242"/>
+            <a:ext cx="4644190" cy="3515218"/>
+            <a:chOff x="120317" y="288759"/>
+            <a:chExt cx="4644190" cy="3515218"/>
           </a:xfrm>
-          <a:prstGeom prst="rect">
-            <a:avLst/>
-          </a:prstGeom>
-          <a:solidFill>
-            <a:schemeClr val="bg2"/>
-          </a:solidFill>
-        </p:spPr>
-        <p:style>
-          <a:lnRef idx="2">
-            <a:schemeClr val="accent1">
-              <a:shade val="50000"/>
-            </a:schemeClr>
-          </a:lnRef>
-          <a:fillRef idx="1">
-            <a:schemeClr val="accent1"/>
-          </a:fillRef>
-          <a:effectRef idx="0">
-            <a:schemeClr val="accent1"/>
-          </a:effectRef>
-          <a:fontRef idx="minor">
-            <a:schemeClr val="lt1"/>
-          </a:fontRef>
-        </p:style>
-        <p:txBody>
-          <a:bodyPr rtlCol="0" anchor="ctr"/>
-          <a:lstStyle/>
-          <a:p>
-            <a:pPr algn="ctr"/>
-            <a:endParaRPr lang="en-US"/>
-          </a:p>
-        </p:txBody>
-      </p:sp>
-      <p:sp>
-        <p:nvSpPr>
-          <p:cNvPr id="5" name="Rectangle 4">
-            <a:extLst>
-              <a:ext uri="{FF2B5EF4-FFF2-40B4-BE49-F238E27FC236}">
-                <a16:creationId xmlns:a16="http://schemas.microsoft.com/office/drawing/2014/main" id="{47185D97-410F-A249-B265-45B6590AE5C4}"/>
-              </a:ext>
-            </a:extLst>
-          </p:cNvPr>
-          <p:cNvSpPr/>
+        </p:grpSpPr>
+        <p:sp>
+          <p:nvSpPr>
+            <p:cNvPr id="4" name="Rectangle 3">
+              <a:extLst>
+                <a:ext uri="{FF2B5EF4-FFF2-40B4-BE49-F238E27FC236}">
+                  <a16:creationId xmlns:a16="http://schemas.microsoft.com/office/drawing/2014/main" id="{156AA6AB-8247-0749-A51B-BE8F0DE1180E}"/>
+                </a:ext>
+              </a:extLst>
+            </p:cNvPr>
+            <p:cNvSpPr/>
+            <p:nvPr/>
+          </p:nvSpPr>
+          <p:spPr>
+            <a:xfrm>
+              <a:off x="120317" y="288759"/>
+              <a:ext cx="4644190" cy="3140242"/>
+            </a:xfrm>
+            <a:prstGeom prst="rect">
+              <a:avLst/>
+            </a:prstGeom>
+            <a:solidFill>
+              <a:schemeClr val="bg2"/>
+            </a:solidFill>
+          </p:spPr>
+          <p:style>
+            <a:lnRef idx="2">
+              <a:schemeClr val="accent1">
+                <a:shade val="50000"/>
+              </a:schemeClr>
+            </a:lnRef>
+            <a:fillRef idx="1">
+              <a:schemeClr val="accent1"/>
+            </a:fillRef>
+            <a:effectRef idx="0">
+              <a:schemeClr val="accent1"/>
+            </a:effectRef>
+            <a:fontRef idx="minor">
+              <a:schemeClr val="lt1"/>
+            </a:fontRef>
+          </p:style>
+          <p:txBody>
+            <a:bodyPr rtlCol="0" anchor="ctr"/>
+            <a:lstStyle/>
+            <a:p>
+              <a:pPr algn="ctr"/>
+              <a:endParaRPr lang="en-US"/>
+            </a:p>
+          </p:txBody>
+        </p:sp>
+        <p:sp>
+          <p:nvSpPr>
+            <p:cNvPr id="5" name="Rectangle 4">
+              <a:extLst>
+                <a:ext uri="{FF2B5EF4-FFF2-40B4-BE49-F238E27FC236}">
+                  <a16:creationId xmlns:a16="http://schemas.microsoft.com/office/drawing/2014/main" id="{47185D97-410F-A249-B265-45B6590AE5C4}"/>
+                </a:ext>
+              </a:extLst>
+            </p:cNvPr>
+            <p:cNvSpPr/>
+            <p:nvPr/>
+          </p:nvSpPr>
+          <p:spPr>
+            <a:xfrm>
+              <a:off x="272716" y="441159"/>
+              <a:ext cx="4386737" cy="417695"/>
+            </a:xfrm>
+            <a:prstGeom prst="rect">
+              <a:avLst/>
+            </a:prstGeom>
+            <a:solidFill>
+              <a:schemeClr val="accent1">
+                <a:lumMod val="60000"/>
+                <a:lumOff val="40000"/>
+              </a:schemeClr>
+            </a:solidFill>
+          </p:spPr>
+          <p:style>
+            <a:lnRef idx="2">
+              <a:schemeClr val="accent1">
+                <a:shade val="50000"/>
+              </a:schemeClr>
+            </a:lnRef>
+            <a:fillRef idx="1">
+              <a:schemeClr val="accent1"/>
+            </a:fillRef>
+            <a:effectRef idx="0">
+              <a:schemeClr val="accent1"/>
+            </a:effectRef>
+            <a:fontRef idx="minor">
+              <a:schemeClr val="lt1"/>
+            </a:fontRef>
+          </p:style>
+          <p:txBody>
+            <a:bodyPr rtlCol="0" anchor="ctr"/>
+            <a:lstStyle/>
+            <a:p>
+              <a:pPr algn="ctr"/>
+              <a:r>
+                <a:rPr lang="en-US" dirty="0" err="1">
+                  <a:solidFill>
+                    <a:sysClr val="windowText" lastClr="000000"/>
+                  </a:solidFill>
+                </a:rPr>
+                <a:t>Nav</a:t>
+              </a:r>
+              <a:r>
+                <a:rPr lang="en-US" dirty="0">
+                  <a:solidFill>
+                    <a:sysClr val="windowText" lastClr="000000"/>
+                  </a:solidFill>
+                </a:rPr>
+                <a:t> Bar</a:t>
+              </a:r>
+            </a:p>
+          </p:txBody>
+        </p:sp>
+        <p:sp>
+          <p:nvSpPr>
+            <p:cNvPr id="6" name="Rectangle 5">
+              <a:extLst>
+                <a:ext uri="{FF2B5EF4-FFF2-40B4-BE49-F238E27FC236}">
+                  <a16:creationId xmlns:a16="http://schemas.microsoft.com/office/drawing/2014/main" id="{C4331BF5-C093-1C4B-881E-982E9E3548C6}"/>
+                </a:ext>
+              </a:extLst>
+            </p:cNvPr>
+            <p:cNvSpPr/>
+            <p:nvPr/>
+          </p:nvSpPr>
+          <p:spPr>
+            <a:xfrm>
+              <a:off x="272716" y="986591"/>
+              <a:ext cx="4386737" cy="2300442"/>
+            </a:xfrm>
+            <a:prstGeom prst="rect">
+              <a:avLst/>
+            </a:prstGeom>
+            <a:solidFill>
+              <a:schemeClr val="accent2">
+                <a:lumMod val="40000"/>
+                <a:lumOff val="60000"/>
+              </a:schemeClr>
+            </a:solidFill>
+          </p:spPr>
+          <p:style>
+            <a:lnRef idx="2">
+              <a:schemeClr val="accent1">
+                <a:shade val="50000"/>
+              </a:schemeClr>
+            </a:lnRef>
+            <a:fillRef idx="1">
+              <a:schemeClr val="accent1"/>
+            </a:fillRef>
+            <a:effectRef idx="0">
+              <a:schemeClr val="accent1"/>
+            </a:effectRef>
+            <a:fontRef idx="minor">
+              <a:schemeClr val="lt1"/>
+            </a:fontRef>
+          </p:style>
+          <p:txBody>
+            <a:bodyPr rtlCol="0" anchor="ctr"/>
+            <a:lstStyle/>
+            <a:p>
+              <a:pPr algn="ctr"/>
+              <a:r>
+                <a:rPr lang="en-US" dirty="0">
+                  <a:solidFill>
+                    <a:sysClr val="windowText" lastClr="000000"/>
+                  </a:solidFill>
+                </a:rPr>
+                <a:t>Article/interactive map</a:t>
+              </a:r>
+            </a:p>
+          </p:txBody>
+        </p:sp>
+        <p:sp>
+          <p:nvSpPr>
+            <p:cNvPr id="7" name="Rectangle 6">
+              <a:extLst>
+                <a:ext uri="{FF2B5EF4-FFF2-40B4-BE49-F238E27FC236}">
+                  <a16:creationId xmlns:a16="http://schemas.microsoft.com/office/drawing/2014/main" id="{1D102CE6-7D42-6B4D-AB0B-9414FBD59985}"/>
+                </a:ext>
+              </a:extLst>
+            </p:cNvPr>
+            <p:cNvSpPr/>
+            <p:nvPr/>
+          </p:nvSpPr>
+          <p:spPr>
+            <a:xfrm>
+              <a:off x="3420979" y="1171677"/>
+              <a:ext cx="1114928" cy="385009"/>
+            </a:xfrm>
+            <a:prstGeom prst="rect">
+              <a:avLst/>
+            </a:prstGeom>
+            <a:solidFill>
+              <a:schemeClr val="accent4">
+                <a:lumMod val="40000"/>
+                <a:lumOff val="60000"/>
+              </a:schemeClr>
+            </a:solidFill>
+          </p:spPr>
+          <p:style>
+            <a:lnRef idx="2">
+              <a:schemeClr val="accent1">
+                <a:shade val="50000"/>
+              </a:schemeClr>
+            </a:lnRef>
+            <a:fillRef idx="1">
+              <a:schemeClr val="accent1"/>
+            </a:fillRef>
+            <a:effectRef idx="0">
+              <a:schemeClr val="accent1"/>
+            </a:effectRef>
+            <a:fontRef idx="minor">
+              <a:schemeClr val="lt1"/>
+            </a:fontRef>
+          </p:style>
+          <p:txBody>
+            <a:bodyPr rtlCol="0" anchor="ctr"/>
+            <a:lstStyle/>
+            <a:p>
+              <a:pPr algn="ctr"/>
+              <a:r>
+                <a:rPr lang="en-US" sz="1200" dirty="0">
+                  <a:solidFill>
+                    <a:sysClr val="windowText" lastClr="000000"/>
+                  </a:solidFill>
+                </a:rPr>
+                <a:t>Toggle &amp; search box</a:t>
+              </a:r>
+            </a:p>
+          </p:txBody>
+        </p:sp>
+        <p:sp>
+          <p:nvSpPr>
+            <p:cNvPr id="2" name="TextBox 1">
+              <a:extLst>
+                <a:ext uri="{FF2B5EF4-FFF2-40B4-BE49-F238E27FC236}">
+                  <a16:creationId xmlns:a16="http://schemas.microsoft.com/office/drawing/2014/main" id="{9C727ADB-E451-F64D-84C9-06D2FAD63957}"/>
+                </a:ext>
+              </a:extLst>
+            </p:cNvPr>
+            <p:cNvSpPr txBox="1"/>
+            <p:nvPr/>
+          </p:nvSpPr>
+          <p:spPr>
+            <a:xfrm>
+              <a:off x="1989126" y="3434645"/>
+              <a:ext cx="953915" cy="369332"/>
+            </a:xfrm>
+            <a:prstGeom prst="rect">
+              <a:avLst/>
+            </a:prstGeom>
+            <a:noFill/>
+          </p:spPr>
+          <p:txBody>
+            <a:bodyPr wrap="none" rtlCol="0">
+              <a:spAutoFit/>
+            </a:bodyPr>
+            <a:lstStyle/>
+            <a:p>
+              <a:r>
+                <a:rPr lang="en-US" dirty="0"/>
+                <a:t>Desktop</a:t>
+              </a:r>
+            </a:p>
+          </p:txBody>
+        </p:sp>
+      </p:grpSp>
+      <p:grpSp>
+        <p:nvGrpSpPr>
+          <p:cNvPr id="13" name="Group 12">
+            <a:extLst>
+              <a:ext uri="{FF2B5EF4-FFF2-40B4-BE49-F238E27FC236}">
+                <a16:creationId xmlns:a16="http://schemas.microsoft.com/office/drawing/2014/main" id="{D6F1D227-AB4A-D343-99AD-15EF1DD3C547}"/>
+              </a:ext>
+            </a:extLst>
+          </p:cNvPr>
+          <p:cNvGrpSpPr/>
           <p:nvPr/>
-        </p:nvSpPr>
-        <p:spPr>
-          <a:xfrm>
-            <a:off x="272717" y="441159"/>
-            <a:ext cx="593560" cy="2845874"/>
-          </a:xfrm>
-          <a:prstGeom prst="rect">
-            <a:avLst/>
-          </a:prstGeom>
-          <a:solidFill>
-            <a:schemeClr val="accent1">
-              <a:lumMod val="60000"/>
-              <a:lumOff val="40000"/>
-            </a:schemeClr>
-          </a:solidFill>
-        </p:spPr>
-        <p:style>
-          <a:lnRef idx="2">
-            <a:schemeClr val="accent1">
-              <a:shade val="50000"/>
-            </a:schemeClr>
-          </a:lnRef>
-          <a:fillRef idx="1">
-            <a:schemeClr val="accent1"/>
-          </a:fillRef>
-          <a:effectRef idx="0">
-            <a:schemeClr val="accent1"/>
-          </a:effectRef>
-          <a:fontRef idx="minor">
-            <a:schemeClr val="lt1"/>
-          </a:fontRef>
-        </p:style>
-        <p:txBody>
-          <a:bodyPr rtlCol="0" anchor="ctr"/>
-          <a:lstStyle/>
-          <a:p>
-            <a:pPr algn="ctr"/>
-            <a:r>
-              <a:rPr lang="en-US" dirty="0" err="1">
-                <a:solidFill>
-                  <a:sysClr val="windowText" lastClr="000000"/>
-                </a:solidFill>
-              </a:rPr>
-              <a:t>Nav</a:t>
-            </a:r>
-            <a:r>
-              <a:rPr lang="en-US" dirty="0">
-                <a:solidFill>
-                  <a:sysClr val="windowText" lastClr="000000"/>
-                </a:solidFill>
-              </a:rPr>
-              <a:t> Bar</a:t>
-            </a:r>
-          </a:p>
-        </p:txBody>
-      </p:sp>
-      <p:sp>
-        <p:nvSpPr>
-          <p:cNvPr id="6" name="Rectangle 5">
-            <a:extLst>
-              <a:ext uri="{FF2B5EF4-FFF2-40B4-BE49-F238E27FC236}">
-                <a16:creationId xmlns:a16="http://schemas.microsoft.com/office/drawing/2014/main" id="{C4331BF5-C093-1C4B-881E-982E9E3548C6}"/>
-              </a:ext>
-            </a:extLst>
-          </p:cNvPr>
-          <p:cNvSpPr/>
-          <p:nvPr/>
-        </p:nvSpPr>
-        <p:spPr>
-          <a:xfrm>
-            <a:off x="1018677" y="441159"/>
-            <a:ext cx="3640776" cy="2845874"/>
-          </a:xfrm>
-          <a:prstGeom prst="rect">
-            <a:avLst/>
-          </a:prstGeom>
-          <a:solidFill>
-            <a:schemeClr val="accent2">
-              <a:lumMod val="40000"/>
-              <a:lumOff val="60000"/>
-            </a:schemeClr>
-          </a:solidFill>
-        </p:spPr>
-        <p:style>
-          <a:lnRef idx="2">
-            <a:schemeClr val="accent1">
-              <a:shade val="50000"/>
-            </a:schemeClr>
-          </a:lnRef>
-          <a:fillRef idx="1">
-            <a:schemeClr val="accent1"/>
-          </a:fillRef>
-          <a:effectRef idx="0">
-            <a:schemeClr val="accent1"/>
-          </a:effectRef>
-          <a:fontRef idx="minor">
-            <a:schemeClr val="lt1"/>
-          </a:fontRef>
-        </p:style>
-        <p:txBody>
-          <a:bodyPr rtlCol="0" anchor="ctr"/>
-          <a:lstStyle/>
-          <a:p>
-            <a:pPr algn="ctr"/>
-            <a:r>
-              <a:rPr lang="en-US" dirty="0">
-                <a:solidFill>
-                  <a:sysClr val="windowText" lastClr="000000"/>
-                </a:solidFill>
-              </a:rPr>
-              <a:t>Article/interactive map</a:t>
-            </a:r>
-          </a:p>
-        </p:txBody>
-      </p:sp>
-      <p:sp>
-        <p:nvSpPr>
-          <p:cNvPr id="7" name="Rectangle 6">
-            <a:extLst>
-              <a:ext uri="{FF2B5EF4-FFF2-40B4-BE49-F238E27FC236}">
-                <a16:creationId xmlns:a16="http://schemas.microsoft.com/office/drawing/2014/main" id="{1D102CE6-7D42-6B4D-AB0B-9414FBD59985}"/>
-              </a:ext>
-            </a:extLst>
-          </p:cNvPr>
-          <p:cNvSpPr/>
-          <p:nvPr/>
-        </p:nvSpPr>
-        <p:spPr>
-          <a:xfrm>
-            <a:off x="3420980" y="601582"/>
-            <a:ext cx="1114928" cy="385009"/>
-          </a:xfrm>
-          <a:prstGeom prst="rect">
-            <a:avLst/>
-          </a:prstGeom>
-          <a:solidFill>
-            <a:schemeClr val="accent4">
-              <a:lumMod val="40000"/>
-              <a:lumOff val="60000"/>
-            </a:schemeClr>
-          </a:solidFill>
-        </p:spPr>
-        <p:style>
-          <a:lnRef idx="2">
-            <a:schemeClr val="accent1">
-              <a:shade val="50000"/>
-            </a:schemeClr>
-          </a:lnRef>
-          <a:fillRef idx="1">
-            <a:schemeClr val="accent1"/>
-          </a:fillRef>
-          <a:effectRef idx="0">
-            <a:schemeClr val="accent1"/>
-          </a:effectRef>
-          <a:fontRef idx="minor">
-            <a:schemeClr val="lt1"/>
-          </a:fontRef>
-        </p:style>
-        <p:txBody>
-          <a:bodyPr rtlCol="0" anchor="ctr"/>
-          <a:lstStyle/>
-          <a:p>
-            <a:pPr algn="ctr"/>
-            <a:r>
-              <a:rPr lang="en-US" sz="1200" dirty="0">
-                <a:solidFill>
-                  <a:sysClr val="windowText" lastClr="000000"/>
-                </a:solidFill>
-              </a:rPr>
-              <a:t>Toggle &amp; search box</a:t>
-            </a:r>
-          </a:p>
-        </p:txBody>
-      </p:sp>
-      <p:sp>
-        <p:nvSpPr>
-          <p:cNvPr id="8" name="Rectangle 7">
-            <a:extLst>
-              <a:ext uri="{FF2B5EF4-FFF2-40B4-BE49-F238E27FC236}">
-                <a16:creationId xmlns:a16="http://schemas.microsoft.com/office/drawing/2014/main" id="{7F643F04-E575-C74F-852B-543DA2E0037D}"/>
-              </a:ext>
-            </a:extLst>
-          </p:cNvPr>
-          <p:cNvSpPr/>
-          <p:nvPr/>
-        </p:nvSpPr>
-        <p:spPr>
+        </p:nvGrpSpPr>
+        <p:grpSpPr>
           <a:xfrm>
             <a:off x="6938211" y="288759"/>
-            <a:ext cx="3633538" cy="3140242"/>
+            <a:ext cx="3633538" cy="3600714"/>
+            <a:chOff x="6938211" y="288759"/>
+            <a:chExt cx="3633538" cy="3600714"/>
           </a:xfrm>
-          <a:prstGeom prst="rect">
-            <a:avLst/>
-          </a:prstGeom>
-          <a:solidFill>
-            <a:schemeClr val="bg2"/>
-          </a:solidFill>
-        </p:spPr>
-        <p:style>
-          <a:lnRef idx="2">
-            <a:schemeClr val="accent1">
-              <a:shade val="50000"/>
-            </a:schemeClr>
-          </a:lnRef>
-          <a:fillRef idx="1">
-            <a:schemeClr val="accent1"/>
-          </a:fillRef>
-          <a:effectRef idx="0">
-            <a:schemeClr val="accent1"/>
-          </a:effectRef>
-          <a:fontRef idx="minor">
-            <a:schemeClr val="lt1"/>
-          </a:fontRef>
-        </p:style>
-        <p:txBody>
-          <a:bodyPr rtlCol="0" anchor="ctr"/>
-          <a:lstStyle/>
-          <a:p>
-            <a:pPr algn="ctr"/>
-            <a:endParaRPr lang="en-US"/>
-          </a:p>
-        </p:txBody>
-      </p:sp>
-      <p:sp>
-        <p:nvSpPr>
-          <p:cNvPr id="9" name="Rectangle 8">
-            <a:extLst>
-              <a:ext uri="{FF2B5EF4-FFF2-40B4-BE49-F238E27FC236}">
-                <a16:creationId xmlns:a16="http://schemas.microsoft.com/office/drawing/2014/main" id="{62BA421C-5CD4-BB44-A4F7-683E6EA2C16E}"/>
-              </a:ext>
-            </a:extLst>
-          </p:cNvPr>
-          <p:cNvSpPr/>
+        </p:grpSpPr>
+        <p:sp>
+          <p:nvSpPr>
+            <p:cNvPr id="8" name="Rectangle 7">
+              <a:extLst>
+                <a:ext uri="{FF2B5EF4-FFF2-40B4-BE49-F238E27FC236}">
+                  <a16:creationId xmlns:a16="http://schemas.microsoft.com/office/drawing/2014/main" id="{7F643F04-E575-C74F-852B-543DA2E0037D}"/>
+                </a:ext>
+              </a:extLst>
+            </p:cNvPr>
+            <p:cNvSpPr/>
+            <p:nvPr/>
+          </p:nvSpPr>
+          <p:spPr>
+            <a:xfrm>
+              <a:off x="6938211" y="288759"/>
+              <a:ext cx="3633538" cy="3140242"/>
+            </a:xfrm>
+            <a:prstGeom prst="rect">
+              <a:avLst/>
+            </a:prstGeom>
+            <a:solidFill>
+              <a:schemeClr val="bg2"/>
+            </a:solidFill>
+          </p:spPr>
+          <p:style>
+            <a:lnRef idx="2">
+              <a:schemeClr val="accent1">
+                <a:shade val="50000"/>
+              </a:schemeClr>
+            </a:lnRef>
+            <a:fillRef idx="1">
+              <a:schemeClr val="accent1"/>
+            </a:fillRef>
+            <a:effectRef idx="0">
+              <a:schemeClr val="accent1"/>
+            </a:effectRef>
+            <a:fontRef idx="minor">
+              <a:schemeClr val="lt1"/>
+            </a:fontRef>
+          </p:style>
+          <p:txBody>
+            <a:bodyPr rtlCol="0" anchor="ctr"/>
+            <a:lstStyle/>
+            <a:p>
+              <a:pPr algn="ctr"/>
+              <a:endParaRPr lang="en-US"/>
+            </a:p>
+          </p:txBody>
+        </p:sp>
+        <p:sp>
+          <p:nvSpPr>
+            <p:cNvPr id="9" name="Rectangle 8">
+              <a:extLst>
+                <a:ext uri="{FF2B5EF4-FFF2-40B4-BE49-F238E27FC236}">
+                  <a16:creationId xmlns:a16="http://schemas.microsoft.com/office/drawing/2014/main" id="{62BA421C-5CD4-BB44-A4F7-683E6EA2C16E}"/>
+                </a:ext>
+              </a:extLst>
+            </p:cNvPr>
+            <p:cNvSpPr/>
+            <p:nvPr/>
+          </p:nvSpPr>
+          <p:spPr>
+            <a:xfrm>
+              <a:off x="7166810" y="462416"/>
+              <a:ext cx="3299884" cy="319239"/>
+            </a:xfrm>
+            <a:prstGeom prst="rect">
+              <a:avLst/>
+            </a:prstGeom>
+            <a:solidFill>
+              <a:schemeClr val="accent1">
+                <a:lumMod val="60000"/>
+                <a:lumOff val="40000"/>
+              </a:schemeClr>
+            </a:solidFill>
+          </p:spPr>
+          <p:style>
+            <a:lnRef idx="2">
+              <a:schemeClr val="accent1">
+                <a:shade val="50000"/>
+              </a:schemeClr>
+            </a:lnRef>
+            <a:fillRef idx="1">
+              <a:schemeClr val="accent1"/>
+            </a:fillRef>
+            <a:effectRef idx="0">
+              <a:schemeClr val="accent1"/>
+            </a:effectRef>
+            <a:fontRef idx="minor">
+              <a:schemeClr val="lt1"/>
+            </a:fontRef>
+          </p:style>
+          <p:txBody>
+            <a:bodyPr rtlCol="0" anchor="ctr"/>
+            <a:lstStyle/>
+            <a:p>
+              <a:pPr algn="ctr"/>
+              <a:r>
+                <a:rPr lang="en-US" dirty="0" err="1">
+                  <a:solidFill>
+                    <a:sysClr val="windowText" lastClr="000000"/>
+                  </a:solidFill>
+                </a:rPr>
+                <a:t>Nav</a:t>
+              </a:r>
+              <a:r>
+                <a:rPr lang="en-US" dirty="0">
+                  <a:solidFill>
+                    <a:sysClr val="windowText" lastClr="000000"/>
+                  </a:solidFill>
+                </a:rPr>
+                <a:t> Bar</a:t>
+              </a:r>
+            </a:p>
+          </p:txBody>
+        </p:sp>
+        <p:sp>
+          <p:nvSpPr>
+            <p:cNvPr id="10" name="Rectangle 9">
+              <a:extLst>
+                <a:ext uri="{FF2B5EF4-FFF2-40B4-BE49-F238E27FC236}">
+                  <a16:creationId xmlns:a16="http://schemas.microsoft.com/office/drawing/2014/main" id="{790F36D7-19CF-714E-BDFC-ACCB0918027B}"/>
+                </a:ext>
+              </a:extLst>
+            </p:cNvPr>
+            <p:cNvSpPr/>
+            <p:nvPr/>
+          </p:nvSpPr>
+          <p:spPr>
+            <a:xfrm>
+              <a:off x="7166810" y="858854"/>
+              <a:ext cx="3299884" cy="2384665"/>
+            </a:xfrm>
+            <a:prstGeom prst="rect">
+              <a:avLst/>
+            </a:prstGeom>
+            <a:solidFill>
+              <a:schemeClr val="accent2">
+                <a:lumMod val="40000"/>
+                <a:lumOff val="60000"/>
+              </a:schemeClr>
+            </a:solidFill>
+          </p:spPr>
+          <p:style>
+            <a:lnRef idx="2">
+              <a:schemeClr val="accent1">
+                <a:shade val="50000"/>
+              </a:schemeClr>
+            </a:lnRef>
+            <a:fillRef idx="1">
+              <a:schemeClr val="accent1"/>
+            </a:fillRef>
+            <a:effectRef idx="0">
+              <a:schemeClr val="accent1"/>
+            </a:effectRef>
+            <a:fontRef idx="minor">
+              <a:schemeClr val="lt1"/>
+            </a:fontRef>
+          </p:style>
+          <p:txBody>
+            <a:bodyPr rtlCol="0" anchor="ctr"/>
+            <a:lstStyle/>
+            <a:p>
+              <a:pPr algn="ctr"/>
+              <a:r>
+                <a:rPr lang="en-US" dirty="0">
+                  <a:solidFill>
+                    <a:sysClr val="windowText" lastClr="000000"/>
+                  </a:solidFill>
+                </a:rPr>
+                <a:t>Article/interactive map</a:t>
+              </a:r>
+            </a:p>
+          </p:txBody>
+        </p:sp>
+        <p:sp>
+          <p:nvSpPr>
+            <p:cNvPr id="11" name="Rectangle 10">
+              <a:extLst>
+                <a:ext uri="{FF2B5EF4-FFF2-40B4-BE49-F238E27FC236}">
+                  <a16:creationId xmlns:a16="http://schemas.microsoft.com/office/drawing/2014/main" id="{6FABABDC-2C73-F348-B525-779840F3FAA8}"/>
+                </a:ext>
+              </a:extLst>
+            </p:cNvPr>
+            <p:cNvSpPr/>
+            <p:nvPr/>
+          </p:nvSpPr>
+          <p:spPr>
+            <a:xfrm>
+              <a:off x="9240253" y="986591"/>
+              <a:ext cx="1114928" cy="385009"/>
+            </a:xfrm>
+            <a:prstGeom prst="rect">
+              <a:avLst/>
+            </a:prstGeom>
+            <a:solidFill>
+              <a:schemeClr val="accent4">
+                <a:lumMod val="40000"/>
+                <a:lumOff val="60000"/>
+              </a:schemeClr>
+            </a:solidFill>
+          </p:spPr>
+          <p:style>
+            <a:lnRef idx="2">
+              <a:schemeClr val="accent1">
+                <a:shade val="50000"/>
+              </a:schemeClr>
+            </a:lnRef>
+            <a:fillRef idx="1">
+              <a:schemeClr val="accent1"/>
+            </a:fillRef>
+            <a:effectRef idx="0">
+              <a:schemeClr val="accent1"/>
+            </a:effectRef>
+            <a:fontRef idx="minor">
+              <a:schemeClr val="lt1"/>
+            </a:fontRef>
+          </p:style>
+          <p:txBody>
+            <a:bodyPr rtlCol="0" anchor="ctr"/>
+            <a:lstStyle/>
+            <a:p>
+              <a:pPr algn="ctr"/>
+              <a:r>
+                <a:rPr lang="en-US" sz="1200" dirty="0">
+                  <a:solidFill>
+                    <a:sysClr val="windowText" lastClr="000000"/>
+                  </a:solidFill>
+                </a:rPr>
+                <a:t>Toggle &amp; search box</a:t>
+              </a:r>
+            </a:p>
+          </p:txBody>
+        </p:sp>
+        <p:sp>
+          <p:nvSpPr>
+            <p:cNvPr id="17" name="TextBox 16">
+              <a:extLst>
+                <a:ext uri="{FF2B5EF4-FFF2-40B4-BE49-F238E27FC236}">
+                  <a16:creationId xmlns:a16="http://schemas.microsoft.com/office/drawing/2014/main" id="{0820DEA5-3B3F-6E4E-A0F5-371B8BFC86BC}"/>
+                </a:ext>
+              </a:extLst>
+            </p:cNvPr>
+            <p:cNvSpPr txBox="1"/>
+            <p:nvPr/>
+          </p:nvSpPr>
+          <p:spPr>
+            <a:xfrm>
+              <a:off x="8278022" y="3520141"/>
+              <a:ext cx="755335" cy="369332"/>
+            </a:xfrm>
+            <a:prstGeom prst="rect">
+              <a:avLst/>
+            </a:prstGeom>
+            <a:noFill/>
+          </p:spPr>
+          <p:txBody>
+            <a:bodyPr wrap="none" rtlCol="0">
+              <a:spAutoFit/>
+            </a:bodyPr>
+            <a:lstStyle/>
+            <a:p>
+              <a:r>
+                <a:rPr lang="en-US" dirty="0"/>
+                <a:t>Tablet</a:t>
+              </a:r>
+            </a:p>
+          </p:txBody>
+        </p:sp>
+      </p:grpSp>
+      <p:grpSp>
+        <p:nvGrpSpPr>
+          <p:cNvPr id="20" name="Group 19">
+            <a:extLst>
+              <a:ext uri="{FF2B5EF4-FFF2-40B4-BE49-F238E27FC236}">
+                <a16:creationId xmlns:a16="http://schemas.microsoft.com/office/drawing/2014/main" id="{352DF8BA-29B5-BF42-85A7-5E8DC153F1ED}"/>
+              </a:ext>
+            </a:extLst>
+          </p:cNvPr>
+          <p:cNvGrpSpPr/>
           <p:nvPr/>
-        </p:nvSpPr>
-        <p:spPr>
+        </p:nvGrpSpPr>
+        <p:grpSpPr>
           <a:xfrm>
-            <a:off x="7715474" y="462416"/>
-            <a:ext cx="2751220" cy="319239"/>
+            <a:off x="3904118" y="3644815"/>
+            <a:ext cx="3607152" cy="3140242"/>
+            <a:chOff x="3904118" y="3644815"/>
+            <a:chExt cx="3607152" cy="3140242"/>
           </a:xfrm>
-          <a:prstGeom prst="rect">
-            <a:avLst/>
-          </a:prstGeom>
-          <a:solidFill>
-            <a:schemeClr val="accent1">
-              <a:lumMod val="60000"/>
-              <a:lumOff val="40000"/>
-            </a:schemeClr>
-          </a:solidFill>
-        </p:spPr>
-        <p:style>
-          <a:lnRef idx="2">
-            <a:schemeClr val="accent1">
-              <a:shade val="50000"/>
-            </a:schemeClr>
-          </a:lnRef>
-          <a:fillRef idx="1">
-            <a:schemeClr val="accent1"/>
-          </a:fillRef>
-          <a:effectRef idx="0">
-            <a:schemeClr val="accent1"/>
-          </a:effectRef>
-          <a:fontRef idx="minor">
-            <a:schemeClr val="lt1"/>
-          </a:fontRef>
-        </p:style>
-        <p:txBody>
-          <a:bodyPr rtlCol="0" anchor="ctr"/>
-          <a:lstStyle/>
-          <a:p>
-            <a:pPr algn="ctr"/>
-            <a:r>
-              <a:rPr lang="en-US" dirty="0" err="1">
-                <a:solidFill>
-                  <a:sysClr val="windowText" lastClr="000000"/>
-                </a:solidFill>
-              </a:rPr>
-              <a:t>Nav</a:t>
-            </a:r>
-            <a:r>
-              <a:rPr lang="en-US" dirty="0">
-                <a:solidFill>
-                  <a:sysClr val="windowText" lastClr="000000"/>
-                </a:solidFill>
-              </a:rPr>
-              <a:t> Bar</a:t>
-            </a:r>
-          </a:p>
-        </p:txBody>
-      </p:sp>
-      <p:sp>
-        <p:nvSpPr>
-          <p:cNvPr id="10" name="Rectangle 9">
-            <a:extLst>
-              <a:ext uri="{FF2B5EF4-FFF2-40B4-BE49-F238E27FC236}">
-                <a16:creationId xmlns:a16="http://schemas.microsoft.com/office/drawing/2014/main" id="{790F36D7-19CF-714E-BDFC-ACCB0918027B}"/>
-              </a:ext>
-            </a:extLst>
-          </p:cNvPr>
-          <p:cNvSpPr/>
-          <p:nvPr/>
-        </p:nvSpPr>
-        <p:spPr>
-          <a:xfrm>
-            <a:off x="7166810" y="858854"/>
-            <a:ext cx="3299884" cy="2384665"/>
-          </a:xfrm>
-          <a:prstGeom prst="rect">
-            <a:avLst/>
-          </a:prstGeom>
-          <a:solidFill>
-            <a:schemeClr val="accent2">
-              <a:lumMod val="40000"/>
-              <a:lumOff val="60000"/>
-            </a:schemeClr>
-          </a:solidFill>
-        </p:spPr>
-        <p:style>
-          <a:lnRef idx="2">
-            <a:schemeClr val="accent1">
-              <a:shade val="50000"/>
-            </a:schemeClr>
-          </a:lnRef>
-          <a:fillRef idx="1">
-            <a:schemeClr val="accent1"/>
-          </a:fillRef>
-          <a:effectRef idx="0">
-            <a:schemeClr val="accent1"/>
-          </a:effectRef>
-          <a:fontRef idx="minor">
-            <a:schemeClr val="lt1"/>
-          </a:fontRef>
-        </p:style>
-        <p:txBody>
-          <a:bodyPr rtlCol="0" anchor="ctr"/>
-          <a:lstStyle/>
-          <a:p>
-            <a:pPr algn="ctr"/>
-            <a:r>
-              <a:rPr lang="en-US" dirty="0">
-                <a:solidFill>
-                  <a:sysClr val="windowText" lastClr="000000"/>
-                </a:solidFill>
-              </a:rPr>
-              <a:t>Article/interactive map</a:t>
-            </a:r>
-          </a:p>
-        </p:txBody>
-      </p:sp>
-      <p:sp>
-        <p:nvSpPr>
-          <p:cNvPr id="11" name="Rectangle 10">
-            <a:extLst>
-              <a:ext uri="{FF2B5EF4-FFF2-40B4-BE49-F238E27FC236}">
-                <a16:creationId xmlns:a16="http://schemas.microsoft.com/office/drawing/2014/main" id="{6FABABDC-2C73-F348-B525-779840F3FAA8}"/>
-              </a:ext>
-            </a:extLst>
-          </p:cNvPr>
-          <p:cNvSpPr/>
-          <p:nvPr/>
-        </p:nvSpPr>
-        <p:spPr>
-          <a:xfrm>
-            <a:off x="9240253" y="986591"/>
-            <a:ext cx="1114928" cy="385009"/>
-          </a:xfrm>
-          <a:prstGeom prst="rect">
-            <a:avLst/>
-          </a:prstGeom>
-          <a:solidFill>
-            <a:schemeClr val="accent4">
-              <a:lumMod val="40000"/>
-              <a:lumOff val="60000"/>
-            </a:schemeClr>
-          </a:solidFill>
-        </p:spPr>
-        <p:style>
-          <a:lnRef idx="2">
-            <a:schemeClr val="accent1">
-              <a:shade val="50000"/>
-            </a:schemeClr>
-          </a:lnRef>
-          <a:fillRef idx="1">
-            <a:schemeClr val="accent1"/>
-          </a:fillRef>
-          <a:effectRef idx="0">
-            <a:schemeClr val="accent1"/>
-          </a:effectRef>
-          <a:fontRef idx="minor">
-            <a:schemeClr val="lt1"/>
-          </a:fontRef>
-        </p:style>
-        <p:txBody>
-          <a:bodyPr rtlCol="0" anchor="ctr"/>
-          <a:lstStyle/>
-          <a:p>
-            <a:pPr algn="ctr"/>
-            <a:r>
-              <a:rPr lang="en-US" sz="1200" dirty="0">
-                <a:solidFill>
-                  <a:sysClr val="windowText" lastClr="000000"/>
-                </a:solidFill>
-              </a:rPr>
-              <a:t>Toggle &amp; search box</a:t>
-            </a:r>
-          </a:p>
-        </p:txBody>
-      </p:sp>
-      <p:sp>
-        <p:nvSpPr>
-          <p:cNvPr id="12" name="Rectangle 11">
-            <a:extLst>
-              <a:ext uri="{FF2B5EF4-FFF2-40B4-BE49-F238E27FC236}">
-                <a16:creationId xmlns:a16="http://schemas.microsoft.com/office/drawing/2014/main" id="{EA6CAEFF-7FFD-4F4D-A147-94D06CA96670}"/>
-              </a:ext>
-            </a:extLst>
-          </p:cNvPr>
-          <p:cNvSpPr/>
-          <p:nvPr/>
-        </p:nvSpPr>
-        <p:spPr>
-          <a:xfrm>
-            <a:off x="5329989" y="3825439"/>
-            <a:ext cx="2723150" cy="3140242"/>
-          </a:xfrm>
-          <a:prstGeom prst="rect">
-            <a:avLst/>
-          </a:prstGeom>
-          <a:solidFill>
-            <a:schemeClr val="bg2"/>
-          </a:solidFill>
-        </p:spPr>
-        <p:style>
-          <a:lnRef idx="2">
-            <a:schemeClr val="accent1">
-              <a:shade val="50000"/>
-            </a:schemeClr>
-          </a:lnRef>
-          <a:fillRef idx="1">
-            <a:schemeClr val="accent1"/>
-          </a:fillRef>
-          <a:effectRef idx="0">
-            <a:schemeClr val="accent1"/>
-          </a:effectRef>
-          <a:fontRef idx="minor">
-            <a:schemeClr val="lt1"/>
-          </a:fontRef>
-        </p:style>
-        <p:txBody>
-          <a:bodyPr rtlCol="0" anchor="ctr"/>
-          <a:lstStyle/>
-          <a:p>
-            <a:pPr algn="ctr"/>
-            <a:endParaRPr lang="en-US"/>
-          </a:p>
-        </p:txBody>
-      </p:sp>
-      <p:sp>
-        <p:nvSpPr>
-          <p:cNvPr id="14" name="Rectangle 13">
-            <a:extLst>
-              <a:ext uri="{FF2B5EF4-FFF2-40B4-BE49-F238E27FC236}">
-                <a16:creationId xmlns:a16="http://schemas.microsoft.com/office/drawing/2014/main" id="{82306F19-793D-1D46-9AB8-B50588D132B8}"/>
-              </a:ext>
-            </a:extLst>
-          </p:cNvPr>
-          <p:cNvSpPr/>
-          <p:nvPr/>
-        </p:nvSpPr>
-        <p:spPr>
-          <a:xfrm>
-            <a:off x="5489406" y="3995477"/>
-            <a:ext cx="2401526" cy="2384665"/>
-          </a:xfrm>
-          <a:prstGeom prst="rect">
-            <a:avLst/>
-          </a:prstGeom>
-          <a:solidFill>
-            <a:schemeClr val="accent2">
-              <a:lumMod val="40000"/>
-              <a:lumOff val="60000"/>
-            </a:schemeClr>
-          </a:solidFill>
-        </p:spPr>
-        <p:style>
-          <a:lnRef idx="2">
-            <a:schemeClr val="accent1">
-              <a:shade val="50000"/>
-            </a:schemeClr>
-          </a:lnRef>
-          <a:fillRef idx="1">
-            <a:schemeClr val="accent1"/>
-          </a:fillRef>
-          <a:effectRef idx="0">
-            <a:schemeClr val="accent1"/>
-          </a:effectRef>
-          <a:fontRef idx="minor">
-            <a:schemeClr val="lt1"/>
-          </a:fontRef>
-        </p:style>
-        <p:txBody>
-          <a:bodyPr rtlCol="0" anchor="ctr"/>
-          <a:lstStyle/>
-          <a:p>
-            <a:pPr algn="ctr"/>
-            <a:r>
-              <a:rPr lang="en-US" dirty="0">
-                <a:solidFill>
-                  <a:sysClr val="windowText" lastClr="000000"/>
-                </a:solidFill>
-              </a:rPr>
-              <a:t>Article/interactive map</a:t>
-            </a:r>
-          </a:p>
-        </p:txBody>
-      </p:sp>
-      <p:sp>
-        <p:nvSpPr>
-          <p:cNvPr id="15" name="Rectangle 14">
-            <a:extLst>
-              <a:ext uri="{FF2B5EF4-FFF2-40B4-BE49-F238E27FC236}">
-                <a16:creationId xmlns:a16="http://schemas.microsoft.com/office/drawing/2014/main" id="{BFFF2B4B-E74E-0E4E-A582-E5FC611D9DA0}"/>
-              </a:ext>
-            </a:extLst>
-          </p:cNvPr>
-          <p:cNvSpPr/>
-          <p:nvPr/>
-        </p:nvSpPr>
-        <p:spPr>
-          <a:xfrm>
-            <a:off x="6664491" y="4123214"/>
-            <a:ext cx="1114928" cy="385009"/>
-          </a:xfrm>
-          <a:prstGeom prst="rect">
-            <a:avLst/>
-          </a:prstGeom>
-          <a:solidFill>
-            <a:schemeClr val="accent4">
-              <a:lumMod val="40000"/>
-              <a:lumOff val="60000"/>
-            </a:schemeClr>
-          </a:solidFill>
-        </p:spPr>
-        <p:style>
-          <a:lnRef idx="2">
-            <a:schemeClr val="accent1">
-              <a:shade val="50000"/>
-            </a:schemeClr>
-          </a:lnRef>
-          <a:fillRef idx="1">
-            <a:schemeClr val="accent1"/>
-          </a:fillRef>
-          <a:effectRef idx="0">
-            <a:schemeClr val="accent1"/>
-          </a:effectRef>
-          <a:fontRef idx="minor">
-            <a:schemeClr val="lt1"/>
-          </a:fontRef>
-        </p:style>
-        <p:txBody>
-          <a:bodyPr rtlCol="0" anchor="ctr"/>
-          <a:lstStyle/>
-          <a:p>
-            <a:pPr algn="ctr"/>
-            <a:r>
-              <a:rPr lang="en-US" sz="1200" dirty="0">
-                <a:solidFill>
-                  <a:sysClr val="windowText" lastClr="000000"/>
-                </a:solidFill>
-              </a:rPr>
-              <a:t>Toggle &amp; search box</a:t>
-            </a:r>
-          </a:p>
-        </p:txBody>
-      </p:sp>
-      <p:sp>
-        <p:nvSpPr>
-          <p:cNvPr id="16" name="Oval 15">
-            <a:extLst>
-              <a:ext uri="{FF2B5EF4-FFF2-40B4-BE49-F238E27FC236}">
-                <a16:creationId xmlns:a16="http://schemas.microsoft.com/office/drawing/2014/main" id="{A3BA502A-FAD5-694C-831F-8DF73081D4FD}"/>
-              </a:ext>
-            </a:extLst>
-          </p:cNvPr>
-          <p:cNvSpPr/>
-          <p:nvPr/>
-        </p:nvSpPr>
-        <p:spPr>
-          <a:xfrm>
-            <a:off x="5532743" y="4063055"/>
-            <a:ext cx="445168" cy="445168"/>
-          </a:xfrm>
-          <a:prstGeom prst="ellipse">
-            <a:avLst/>
-          </a:prstGeom>
-        </p:spPr>
-        <p:style>
-          <a:lnRef idx="2">
-            <a:schemeClr val="accent1">
-              <a:shade val="50000"/>
-            </a:schemeClr>
-          </a:lnRef>
-          <a:fillRef idx="1">
-            <a:schemeClr val="accent1"/>
-          </a:fillRef>
-          <a:effectRef idx="0">
-            <a:schemeClr val="accent1"/>
-          </a:effectRef>
-          <a:fontRef idx="minor">
-            <a:schemeClr val="lt1"/>
-          </a:fontRef>
-        </p:style>
-        <p:txBody>
-          <a:bodyPr tIns="0" bIns="0" rtlCol="0" anchor="ctr"/>
-          <a:lstStyle/>
-          <a:p>
-            <a:pPr algn="ctr"/>
-            <a:r>
-              <a:rPr lang="en-US" dirty="0"/>
-              <a:t>=</a:t>
-            </a:r>
-          </a:p>
-          <a:p>
-            <a:pPr algn="ctr">
-              <a:lnSpc>
-                <a:spcPts val="200"/>
-              </a:lnSpc>
-            </a:pPr>
-            <a:r>
-              <a:rPr lang="en-US" dirty="0"/>
-              <a:t>=</a:t>
-            </a:r>
-          </a:p>
-        </p:txBody>
-      </p:sp>
+        </p:grpSpPr>
+        <p:grpSp>
+          <p:nvGrpSpPr>
+            <p:cNvPr id="3" name="Group 2">
+              <a:extLst>
+                <a:ext uri="{FF2B5EF4-FFF2-40B4-BE49-F238E27FC236}">
+                  <a16:creationId xmlns:a16="http://schemas.microsoft.com/office/drawing/2014/main" id="{0E1228F8-0C2F-4040-A49E-DA36B5530E7B}"/>
+                </a:ext>
+              </a:extLst>
+            </p:cNvPr>
+            <p:cNvGrpSpPr/>
+            <p:nvPr/>
+          </p:nvGrpSpPr>
+          <p:grpSpPr>
+            <a:xfrm>
+              <a:off x="4788120" y="3644815"/>
+              <a:ext cx="2723150" cy="3140242"/>
+              <a:chOff x="4788120" y="3644815"/>
+              <a:chExt cx="2723150" cy="3140242"/>
+            </a:xfrm>
+          </p:grpSpPr>
+          <p:sp>
+            <p:nvSpPr>
+              <p:cNvPr id="12" name="Rectangle 11">
+                <a:extLst>
+                  <a:ext uri="{FF2B5EF4-FFF2-40B4-BE49-F238E27FC236}">
+                    <a16:creationId xmlns:a16="http://schemas.microsoft.com/office/drawing/2014/main" id="{EA6CAEFF-7FFD-4F4D-A147-94D06CA96670}"/>
+                  </a:ext>
+                </a:extLst>
+              </p:cNvPr>
+              <p:cNvSpPr/>
+              <p:nvPr/>
+            </p:nvSpPr>
+            <p:spPr>
+              <a:xfrm>
+                <a:off x="4788120" y="3644815"/>
+                <a:ext cx="2723150" cy="3140242"/>
+              </a:xfrm>
+              <a:prstGeom prst="rect">
+                <a:avLst/>
+              </a:prstGeom>
+              <a:solidFill>
+                <a:schemeClr val="bg2"/>
+              </a:solidFill>
+            </p:spPr>
+            <p:style>
+              <a:lnRef idx="2">
+                <a:schemeClr val="accent1">
+                  <a:shade val="50000"/>
+                </a:schemeClr>
+              </a:lnRef>
+              <a:fillRef idx="1">
+                <a:schemeClr val="accent1"/>
+              </a:fillRef>
+              <a:effectRef idx="0">
+                <a:schemeClr val="accent1"/>
+              </a:effectRef>
+              <a:fontRef idx="minor">
+                <a:schemeClr val="lt1"/>
+              </a:fontRef>
+            </p:style>
+            <p:txBody>
+              <a:bodyPr rtlCol="0" anchor="ctr"/>
+              <a:lstStyle/>
+              <a:p>
+                <a:pPr algn="ctr"/>
+                <a:endParaRPr lang="en-US"/>
+              </a:p>
+            </p:txBody>
+          </p:sp>
+          <p:sp>
+            <p:nvSpPr>
+              <p:cNvPr id="14" name="Rectangle 13">
+                <a:extLst>
+                  <a:ext uri="{FF2B5EF4-FFF2-40B4-BE49-F238E27FC236}">
+                    <a16:creationId xmlns:a16="http://schemas.microsoft.com/office/drawing/2014/main" id="{82306F19-793D-1D46-9AB8-B50588D132B8}"/>
+                  </a:ext>
+                </a:extLst>
+              </p:cNvPr>
+              <p:cNvSpPr/>
+              <p:nvPr/>
+            </p:nvSpPr>
+            <p:spPr>
+              <a:xfrm>
+                <a:off x="4947537" y="4209967"/>
+                <a:ext cx="2401526" cy="2384665"/>
+              </a:xfrm>
+              <a:prstGeom prst="rect">
+                <a:avLst/>
+              </a:prstGeom>
+              <a:solidFill>
+                <a:schemeClr val="accent2">
+                  <a:lumMod val="40000"/>
+                  <a:lumOff val="60000"/>
+                </a:schemeClr>
+              </a:solidFill>
+            </p:spPr>
+            <p:style>
+              <a:lnRef idx="2">
+                <a:schemeClr val="accent1">
+                  <a:shade val="50000"/>
+                </a:schemeClr>
+              </a:lnRef>
+              <a:fillRef idx="1">
+                <a:schemeClr val="accent1"/>
+              </a:fillRef>
+              <a:effectRef idx="0">
+                <a:schemeClr val="accent1"/>
+              </a:effectRef>
+              <a:fontRef idx="minor">
+                <a:schemeClr val="lt1"/>
+              </a:fontRef>
+            </p:style>
+            <p:txBody>
+              <a:bodyPr rtlCol="0" anchor="ctr"/>
+              <a:lstStyle/>
+              <a:p>
+                <a:pPr algn="ctr"/>
+                <a:r>
+                  <a:rPr lang="en-US" dirty="0">
+                    <a:solidFill>
+                      <a:sysClr val="windowText" lastClr="000000"/>
+                    </a:solidFill>
+                  </a:rPr>
+                  <a:t>Article/interactive map</a:t>
+                </a:r>
+              </a:p>
+            </p:txBody>
+          </p:sp>
+          <p:sp>
+            <p:nvSpPr>
+              <p:cNvPr id="15" name="Rectangle 14">
+                <a:extLst>
+                  <a:ext uri="{FF2B5EF4-FFF2-40B4-BE49-F238E27FC236}">
+                    <a16:creationId xmlns:a16="http://schemas.microsoft.com/office/drawing/2014/main" id="{BFFF2B4B-E74E-0E4E-A582-E5FC611D9DA0}"/>
+                  </a:ext>
+                </a:extLst>
+              </p:cNvPr>
+              <p:cNvSpPr/>
+              <p:nvPr/>
+            </p:nvSpPr>
+            <p:spPr>
+              <a:xfrm>
+                <a:off x="6122622" y="4337704"/>
+                <a:ext cx="1114928" cy="385009"/>
+              </a:xfrm>
+              <a:prstGeom prst="rect">
+                <a:avLst/>
+              </a:prstGeom>
+              <a:solidFill>
+                <a:schemeClr val="accent4">
+                  <a:lumMod val="40000"/>
+                  <a:lumOff val="60000"/>
+                </a:schemeClr>
+              </a:solidFill>
+            </p:spPr>
+            <p:style>
+              <a:lnRef idx="2">
+                <a:schemeClr val="accent1">
+                  <a:shade val="50000"/>
+                </a:schemeClr>
+              </a:lnRef>
+              <a:fillRef idx="1">
+                <a:schemeClr val="accent1"/>
+              </a:fillRef>
+              <a:effectRef idx="0">
+                <a:schemeClr val="accent1"/>
+              </a:effectRef>
+              <a:fontRef idx="minor">
+                <a:schemeClr val="lt1"/>
+              </a:fontRef>
+            </p:style>
+            <p:txBody>
+              <a:bodyPr rtlCol="0" anchor="ctr"/>
+              <a:lstStyle/>
+              <a:p>
+                <a:pPr algn="ctr"/>
+                <a:r>
+                  <a:rPr lang="en-US" sz="1200" dirty="0">
+                    <a:solidFill>
+                      <a:sysClr val="windowText" lastClr="000000"/>
+                    </a:solidFill>
+                  </a:rPr>
+                  <a:t>Toggle &amp; search box</a:t>
+                </a:r>
+              </a:p>
+            </p:txBody>
+          </p:sp>
+          <p:sp>
+            <p:nvSpPr>
+              <p:cNvPr id="16" name="Oval 15">
+                <a:extLst>
+                  <a:ext uri="{FF2B5EF4-FFF2-40B4-BE49-F238E27FC236}">
+                    <a16:creationId xmlns:a16="http://schemas.microsoft.com/office/drawing/2014/main" id="{A3BA502A-FAD5-694C-831F-8DF73081D4FD}"/>
+                  </a:ext>
+                </a:extLst>
+              </p:cNvPr>
+              <p:cNvSpPr/>
+              <p:nvPr/>
+            </p:nvSpPr>
+            <p:spPr>
+              <a:xfrm>
+                <a:off x="6792382" y="3704807"/>
+                <a:ext cx="445168" cy="445168"/>
+              </a:xfrm>
+              <a:prstGeom prst="ellipse">
+                <a:avLst/>
+              </a:prstGeom>
+            </p:spPr>
+            <p:style>
+              <a:lnRef idx="2">
+                <a:schemeClr val="accent1">
+                  <a:shade val="50000"/>
+                </a:schemeClr>
+              </a:lnRef>
+              <a:fillRef idx="1">
+                <a:schemeClr val="accent1"/>
+              </a:fillRef>
+              <a:effectRef idx="0">
+                <a:schemeClr val="accent1"/>
+              </a:effectRef>
+              <a:fontRef idx="minor">
+                <a:schemeClr val="lt1"/>
+              </a:fontRef>
+            </p:style>
+            <p:txBody>
+              <a:bodyPr tIns="0" bIns="0" rtlCol="0" anchor="ctr"/>
+              <a:lstStyle/>
+              <a:p>
+                <a:pPr algn="ctr"/>
+                <a:r>
+                  <a:rPr lang="en-US" dirty="0"/>
+                  <a:t>=</a:t>
+                </a:r>
+              </a:p>
+              <a:p>
+                <a:pPr algn="ctr">
+                  <a:lnSpc>
+                    <a:spcPts val="200"/>
+                  </a:lnSpc>
+                </a:pPr>
+                <a:r>
+                  <a:rPr lang="en-US" dirty="0"/>
+                  <a:t>=</a:t>
+                </a:r>
+              </a:p>
+            </p:txBody>
+          </p:sp>
+        </p:grpSp>
+        <p:sp>
+          <p:nvSpPr>
+            <p:cNvPr id="18" name="TextBox 17">
+              <a:extLst>
+                <a:ext uri="{FF2B5EF4-FFF2-40B4-BE49-F238E27FC236}">
+                  <a16:creationId xmlns:a16="http://schemas.microsoft.com/office/drawing/2014/main" id="{867AAAC1-6930-B849-BC62-5F76E5F5191F}"/>
+                </a:ext>
+              </a:extLst>
+            </p:cNvPr>
+            <p:cNvSpPr txBox="1"/>
+            <p:nvPr/>
+          </p:nvSpPr>
+          <p:spPr>
+            <a:xfrm>
+              <a:off x="3904118" y="5032967"/>
+              <a:ext cx="846707" cy="369332"/>
+            </a:xfrm>
+            <a:prstGeom prst="rect">
+              <a:avLst/>
+            </a:prstGeom>
+            <a:noFill/>
+          </p:spPr>
+          <p:txBody>
+            <a:bodyPr wrap="none" rtlCol="0">
+              <a:spAutoFit/>
+            </a:bodyPr>
+            <a:lstStyle/>
+            <a:p>
+              <a:r>
+                <a:rPr lang="en-US" dirty="0"/>
+                <a:t>Mobile</a:t>
+              </a:r>
+            </a:p>
+          </p:txBody>
+        </p:sp>
+      </p:grpSp>
     </p:spTree>
     <p:extLst>
       <p:ext uri="{BB962C8B-B14F-4D97-AF65-F5344CB8AC3E}">
@@ -4054,731 +4241,462 @@
           <a:chExt cx="0" cy="0"/>
         </a:xfrm>
       </p:grpSpPr>
-      <p:sp>
-        <p:nvSpPr>
-          <p:cNvPr id="2" name="Rectangle 1">
-            <a:extLst>
-              <a:ext uri="{FF2B5EF4-FFF2-40B4-BE49-F238E27FC236}">
-                <a16:creationId xmlns:a16="http://schemas.microsoft.com/office/drawing/2014/main" id="{505C5A59-FB7C-2749-9378-63C25D9835B0}"/>
-              </a:ext>
-            </a:extLst>
-          </p:cNvPr>
-          <p:cNvSpPr/>
+      <p:grpSp>
+        <p:nvGrpSpPr>
+          <p:cNvPr id="9" name="Group 8">
+            <a:extLst>
+              <a:ext uri="{FF2B5EF4-FFF2-40B4-BE49-F238E27FC236}">
+                <a16:creationId xmlns:a16="http://schemas.microsoft.com/office/drawing/2014/main" id="{46BEF653-3D5D-684A-BCF9-6B76D67AE71D}"/>
+              </a:ext>
+            </a:extLst>
+          </p:cNvPr>
+          <p:cNvGrpSpPr/>
           <p:nvPr/>
-        </p:nvSpPr>
-        <p:spPr>
+        </p:nvGrpSpPr>
+        <p:grpSpPr>
           <a:xfrm>
-            <a:off x="272716" y="441159"/>
-            <a:ext cx="2313322" cy="6059654"/>
+            <a:off x="6267792" y="4124009"/>
+            <a:ext cx="5641987" cy="1884682"/>
+            <a:chOff x="6267792" y="4124009"/>
+            <a:chExt cx="5641987" cy="1884682"/>
           </a:xfrm>
-          <a:prstGeom prst="rect">
-            <a:avLst/>
-          </a:prstGeom>
-          <a:solidFill>
-            <a:schemeClr val="accent1">
-              <a:lumMod val="20000"/>
-              <a:lumOff val="80000"/>
-            </a:schemeClr>
-          </a:solidFill>
-        </p:spPr>
-        <p:style>
-          <a:lnRef idx="2">
-            <a:schemeClr val="accent1">
-              <a:shade val="50000"/>
-            </a:schemeClr>
-          </a:lnRef>
-          <a:fillRef idx="1">
-            <a:schemeClr val="accent1"/>
-          </a:fillRef>
-          <a:effectRef idx="0">
-            <a:schemeClr val="accent1"/>
-          </a:effectRef>
-          <a:fontRef idx="minor">
-            <a:schemeClr val="lt1"/>
-          </a:fontRef>
-        </p:style>
-        <p:txBody>
-          <a:bodyPr rtlCol="0" anchor="ctr"/>
-          <a:lstStyle/>
-          <a:p>
-            <a:pPr algn="ctr">
-              <a:lnSpc>
-                <a:spcPct val="150000"/>
-              </a:lnSpc>
-            </a:pPr>
-            <a:r>
-              <a:rPr lang="en-US" sz="2800" dirty="0" err="1">
+        </p:grpSpPr>
+        <p:sp>
+          <p:nvSpPr>
+            <p:cNvPr id="3" name="Rectangle 2">
+              <a:extLst>
+                <a:ext uri="{FF2B5EF4-FFF2-40B4-BE49-F238E27FC236}">
+                  <a16:creationId xmlns:a16="http://schemas.microsoft.com/office/drawing/2014/main" id="{145D4A75-8A5C-0D48-BB97-4841463D4A85}"/>
+                </a:ext>
+              </a:extLst>
+            </p:cNvPr>
+            <p:cNvSpPr/>
+            <p:nvPr/>
+          </p:nvSpPr>
+          <p:spPr>
+            <a:xfrm>
+              <a:off x="6267792" y="4316891"/>
+              <a:ext cx="1893722" cy="1691800"/>
+            </a:xfrm>
+            <a:prstGeom prst="rect">
+              <a:avLst/>
+            </a:prstGeom>
+            <a:solidFill>
+              <a:schemeClr val="accent4">
+                <a:lumMod val="40000"/>
+                <a:lumOff val="60000"/>
+              </a:schemeClr>
+            </a:solidFill>
+          </p:spPr>
+          <p:style>
+            <a:lnRef idx="2">
+              <a:schemeClr val="accent1">
+                <a:shade val="50000"/>
+              </a:schemeClr>
+            </a:lnRef>
+            <a:fillRef idx="1">
+              <a:schemeClr val="accent1"/>
+            </a:fillRef>
+            <a:effectRef idx="0">
+              <a:schemeClr val="accent1"/>
+            </a:effectRef>
+            <a:fontRef idx="minor">
+              <a:schemeClr val="lt1"/>
+            </a:fontRef>
+          </p:style>
+          <p:txBody>
+            <a:bodyPr rtlCol="0" anchor="ctr"/>
+            <a:lstStyle/>
+            <a:p>
+              <a:pPr algn="ctr"/>
+              <a:r>
+                <a:rPr lang="en-US" sz="1600" dirty="0">
+                  <a:solidFill>
+                    <a:sysClr val="windowText" lastClr="000000"/>
+                  </a:solidFill>
+                </a:rPr>
+                <a:t>Layer Toggle</a:t>
+              </a:r>
+            </a:p>
+            <a:p>
+              <a:endParaRPr lang="en-US" sz="1600" dirty="0">
                 <a:solidFill>
                   <a:sysClr val="windowText" lastClr="000000"/>
                 </a:solidFill>
-              </a:rPr>
-              <a:t>Nav</a:t>
-            </a:r>
-            <a:r>
-              <a:rPr lang="en-US" sz="2800" dirty="0">
+              </a:endParaRPr>
+            </a:p>
+            <a:p>
+              <a:r>
+                <a:rPr lang="en-US" sz="2000" dirty="0">
+                  <a:solidFill>
+                    <a:sysClr val="windowText" lastClr="000000"/>
+                  </a:solidFill>
+                </a:rPr>
+                <a:t>Primary Layer</a:t>
+              </a:r>
+            </a:p>
+            <a:p>
+              <a:endParaRPr lang="en-US" sz="2000" dirty="0">
                 <a:solidFill>
                   <a:sysClr val="windowText" lastClr="000000"/>
                 </a:solidFill>
-              </a:rPr>
-              <a:t> Bar</a:t>
-            </a:r>
-          </a:p>
-          <a:p>
-            <a:pPr>
-              <a:lnSpc>
-                <a:spcPct val="150000"/>
-              </a:lnSpc>
-            </a:pPr>
-            <a:endParaRPr lang="en-US" sz="1600" dirty="0">
-              <a:solidFill>
-                <a:sysClr val="windowText" lastClr="000000"/>
-              </a:solidFill>
-            </a:endParaRPr>
-          </a:p>
-          <a:p>
-            <a:pPr>
-              <a:lnSpc>
-                <a:spcPct val="150000"/>
-              </a:lnSpc>
-            </a:pPr>
-            <a:r>
-              <a:rPr lang="en-US" sz="1600" dirty="0">
-                <a:solidFill>
-                  <a:sysClr val="windowText" lastClr="000000"/>
-                </a:solidFill>
-              </a:rPr>
-              <a:t>About This Website</a:t>
-            </a:r>
-          </a:p>
-          <a:p>
-            <a:pPr>
-              <a:lnSpc>
-                <a:spcPct val="150000"/>
-              </a:lnSpc>
-            </a:pPr>
-            <a:endParaRPr lang="en-US" sz="1600" dirty="0">
-              <a:solidFill>
-                <a:sysClr val="windowText" lastClr="000000"/>
-              </a:solidFill>
-            </a:endParaRPr>
-          </a:p>
-          <a:p>
-            <a:pPr>
-              <a:lnSpc>
-                <a:spcPct val="150000"/>
-              </a:lnSpc>
-            </a:pPr>
-            <a:r>
-              <a:rPr lang="en-US" sz="1600" dirty="0">
-                <a:solidFill>
-                  <a:sysClr val="windowText" lastClr="000000"/>
-                </a:solidFill>
-              </a:rPr>
-              <a:t>Data Source</a:t>
-            </a:r>
-          </a:p>
-          <a:p>
-            <a:pPr>
-              <a:lnSpc>
-                <a:spcPct val="150000"/>
-              </a:lnSpc>
-            </a:pPr>
-            <a:endParaRPr lang="en-US" sz="1600" dirty="0">
-              <a:solidFill>
-                <a:sysClr val="windowText" lastClr="000000"/>
-              </a:solidFill>
-            </a:endParaRPr>
-          </a:p>
-          <a:p>
-            <a:pPr>
-              <a:lnSpc>
-                <a:spcPct val="150000"/>
-              </a:lnSpc>
-            </a:pPr>
-            <a:r>
-              <a:rPr lang="en-US" sz="1600" dirty="0">
-                <a:solidFill>
-                  <a:sysClr val="windowText" lastClr="000000"/>
-                </a:solidFill>
-              </a:rPr>
-              <a:t>How to Use</a:t>
-            </a:r>
-          </a:p>
-          <a:p>
-            <a:pPr>
-              <a:lnSpc>
-                <a:spcPct val="150000"/>
-              </a:lnSpc>
-            </a:pPr>
-            <a:endParaRPr lang="en-US" sz="1600" dirty="0">
-              <a:solidFill>
-                <a:sysClr val="windowText" lastClr="000000"/>
-              </a:solidFill>
-            </a:endParaRPr>
-          </a:p>
-          <a:p>
-            <a:pPr>
-              <a:lnSpc>
-                <a:spcPct val="150000"/>
-              </a:lnSpc>
-            </a:pPr>
-            <a:r>
-              <a:rPr lang="en-US" sz="1600" dirty="0">
-                <a:solidFill>
-                  <a:sysClr val="windowText" lastClr="000000"/>
-                </a:solidFill>
-              </a:rPr>
-              <a:t>Dengue Fever</a:t>
-            </a:r>
-          </a:p>
-          <a:p>
-            <a:pPr>
-              <a:lnSpc>
-                <a:spcPct val="150000"/>
-              </a:lnSpc>
-            </a:pPr>
-            <a:endParaRPr lang="en-US" sz="1600" dirty="0">
-              <a:solidFill>
-                <a:sysClr val="windowText" lastClr="000000"/>
-              </a:solidFill>
-            </a:endParaRPr>
-          </a:p>
-          <a:p>
-            <a:pPr>
-              <a:lnSpc>
-                <a:spcPct val="150000"/>
-              </a:lnSpc>
-            </a:pPr>
-            <a:r>
-              <a:rPr lang="en-US" sz="1600" dirty="0">
-                <a:solidFill>
-                  <a:sysClr val="windowText" lastClr="000000"/>
-                </a:solidFill>
-              </a:rPr>
-              <a:t>COVID-19</a:t>
-            </a:r>
-          </a:p>
-          <a:p>
-            <a:pPr>
-              <a:lnSpc>
-                <a:spcPct val="150000"/>
-              </a:lnSpc>
-            </a:pPr>
-            <a:endParaRPr lang="en-US" sz="1600" dirty="0">
-              <a:solidFill>
-                <a:sysClr val="windowText" lastClr="000000"/>
-              </a:solidFill>
-            </a:endParaRPr>
-          </a:p>
-          <a:p>
-            <a:pPr>
-              <a:lnSpc>
-                <a:spcPct val="150000"/>
-              </a:lnSpc>
-            </a:pPr>
-            <a:r>
-              <a:rPr lang="en-US" sz="1600" dirty="0">
-                <a:solidFill>
-                  <a:sysClr val="windowText" lastClr="000000"/>
-                </a:solidFill>
-              </a:rPr>
-              <a:t>Stay-Home-Notice Hotels</a:t>
-            </a:r>
-          </a:p>
-          <a:p>
-            <a:pPr>
-              <a:lnSpc>
-                <a:spcPct val="150000"/>
-              </a:lnSpc>
-            </a:pPr>
-            <a:endParaRPr lang="en-US" sz="1600" dirty="0">
-              <a:solidFill>
-                <a:sysClr val="windowText" lastClr="000000"/>
-              </a:solidFill>
-            </a:endParaRPr>
-          </a:p>
-        </p:txBody>
-      </p:sp>
-      <p:sp>
-        <p:nvSpPr>
-          <p:cNvPr id="3" name="Rectangle 2">
-            <a:extLst>
-              <a:ext uri="{FF2B5EF4-FFF2-40B4-BE49-F238E27FC236}">
-                <a16:creationId xmlns:a16="http://schemas.microsoft.com/office/drawing/2014/main" id="{145D4A75-8A5C-0D48-BB97-4841463D4A85}"/>
-              </a:ext>
-            </a:extLst>
-          </p:cNvPr>
-          <p:cNvSpPr/>
+              </a:endParaRPr>
+            </a:p>
+            <a:p>
+              <a:r>
+                <a:rPr lang="en-US" sz="2000" dirty="0">
+                  <a:solidFill>
+                    <a:sysClr val="windowText" lastClr="000000"/>
+                  </a:solidFill>
+                </a:rPr>
+                <a:t>Secondary Layer</a:t>
+              </a:r>
+            </a:p>
+          </p:txBody>
+        </p:sp>
+        <p:sp>
+          <p:nvSpPr>
+            <p:cNvPr id="4" name="Rounded Rectangular Callout 3">
+              <a:extLst>
+                <a:ext uri="{FF2B5EF4-FFF2-40B4-BE49-F238E27FC236}">
+                  <a16:creationId xmlns:a16="http://schemas.microsoft.com/office/drawing/2014/main" id="{6EBB775B-FFE8-A547-A748-1F9B08D9B0F5}"/>
+                </a:ext>
+              </a:extLst>
+            </p:cNvPr>
+            <p:cNvSpPr/>
+            <p:nvPr/>
+          </p:nvSpPr>
+          <p:spPr>
+            <a:xfrm>
+              <a:off x="8918753" y="4124009"/>
+              <a:ext cx="2991026" cy="1057275"/>
+            </a:xfrm>
+            <a:prstGeom prst="wedgeRoundRectCallout">
+              <a:avLst>
+                <a:gd name="adj1" fmla="val -73372"/>
+                <a:gd name="adj2" fmla="val 44823"/>
+                <a:gd name="adj3" fmla="val 16667"/>
+              </a:avLst>
+            </a:prstGeom>
+            <a:solidFill>
+              <a:schemeClr val="accent6">
+                <a:lumMod val="75000"/>
+              </a:schemeClr>
+            </a:solidFill>
+          </p:spPr>
+          <p:style>
+            <a:lnRef idx="2">
+              <a:schemeClr val="accent1">
+                <a:shade val="50000"/>
+              </a:schemeClr>
+            </a:lnRef>
+            <a:fillRef idx="1">
+              <a:schemeClr val="accent1"/>
+            </a:fillRef>
+            <a:effectRef idx="0">
+              <a:schemeClr val="accent1"/>
+            </a:effectRef>
+            <a:fontRef idx="minor">
+              <a:schemeClr val="lt1"/>
+            </a:fontRef>
+          </p:style>
+          <p:txBody>
+            <a:bodyPr rtlCol="0" anchor="ctr"/>
+            <a:lstStyle/>
+            <a:p>
+              <a:r>
+                <a:rPr lang="en-US" sz="1600" dirty="0"/>
+                <a:t>All Hotels</a:t>
+              </a:r>
+            </a:p>
+            <a:p>
+              <a:r>
+                <a:rPr lang="en-US" sz="1600" dirty="0"/>
+                <a:t>Staycation Hotels</a:t>
+              </a:r>
+            </a:p>
+            <a:p>
+              <a:r>
+                <a:rPr lang="en-US" sz="1600" dirty="0"/>
+                <a:t>SHN Hotels</a:t>
+              </a:r>
+            </a:p>
+            <a:p>
+              <a:r>
+                <a:rPr lang="en-US" sz="1600" dirty="0"/>
+                <a:t>Non-SHN Staycation Hotels</a:t>
+              </a:r>
+            </a:p>
+          </p:txBody>
+        </p:sp>
+        <p:sp>
+          <p:nvSpPr>
+            <p:cNvPr id="5" name="Rounded Rectangular Callout 4">
+              <a:extLst>
+                <a:ext uri="{FF2B5EF4-FFF2-40B4-BE49-F238E27FC236}">
+                  <a16:creationId xmlns:a16="http://schemas.microsoft.com/office/drawing/2014/main" id="{FC9377FF-720A-E04C-941E-347B967AEDE9}"/>
+                </a:ext>
+              </a:extLst>
+            </p:cNvPr>
+            <p:cNvSpPr/>
+            <p:nvPr/>
+          </p:nvSpPr>
+          <p:spPr>
+            <a:xfrm>
+              <a:off x="8918751" y="5181284"/>
+              <a:ext cx="2991028" cy="827407"/>
+            </a:xfrm>
+            <a:prstGeom prst="wedgeRoundRectCallout">
+              <a:avLst>
+                <a:gd name="adj1" fmla="val -72018"/>
+                <a:gd name="adj2" fmla="val 20186"/>
+                <a:gd name="adj3" fmla="val 16667"/>
+              </a:avLst>
+            </a:prstGeom>
+            <a:solidFill>
+              <a:schemeClr val="accent6">
+                <a:lumMod val="75000"/>
+              </a:schemeClr>
+            </a:solidFill>
+          </p:spPr>
+          <p:style>
+            <a:lnRef idx="2">
+              <a:schemeClr val="accent1">
+                <a:shade val="50000"/>
+              </a:schemeClr>
+            </a:lnRef>
+            <a:fillRef idx="1">
+              <a:schemeClr val="accent1"/>
+            </a:fillRef>
+            <a:effectRef idx="0">
+              <a:schemeClr val="accent1"/>
+            </a:effectRef>
+            <a:fontRef idx="minor">
+              <a:schemeClr val="lt1"/>
+            </a:fontRef>
+          </p:style>
+          <p:txBody>
+            <a:bodyPr rtlCol="0" anchor="ctr"/>
+            <a:lstStyle/>
+            <a:p>
+              <a:r>
+                <a:rPr lang="en-US" sz="1600" dirty="0"/>
+                <a:t>COVID-19 Clusters</a:t>
+              </a:r>
+            </a:p>
+            <a:p>
+              <a:r>
+                <a:rPr lang="en-US" sz="1600" dirty="0"/>
+                <a:t>Dengue Clusters</a:t>
+              </a:r>
+            </a:p>
+          </p:txBody>
+        </p:sp>
+      </p:grpSp>
+      <p:grpSp>
+        <p:nvGrpSpPr>
+          <p:cNvPr id="8" name="Group 7">
+            <a:extLst>
+              <a:ext uri="{FF2B5EF4-FFF2-40B4-BE49-F238E27FC236}">
+                <a16:creationId xmlns:a16="http://schemas.microsoft.com/office/drawing/2014/main" id="{E74DF75B-B17A-FC4F-8C6A-5CC7420C5091}"/>
+              </a:ext>
+            </a:extLst>
+          </p:cNvPr>
+          <p:cNvGrpSpPr/>
           <p:nvPr/>
-        </p:nvSpPr>
-        <p:spPr>
+        </p:nvGrpSpPr>
+        <p:grpSpPr>
           <a:xfrm>
-            <a:off x="4935703" y="1980088"/>
-            <a:ext cx="1893722" cy="1691800"/>
+            <a:off x="272714" y="373427"/>
+            <a:ext cx="7990751" cy="1997240"/>
+            <a:chOff x="272714" y="373427"/>
+            <a:chExt cx="7990751" cy="1997240"/>
           </a:xfrm>
-          <a:prstGeom prst="rect">
-            <a:avLst/>
-          </a:prstGeom>
-          <a:solidFill>
-            <a:schemeClr val="accent4">
-              <a:lumMod val="40000"/>
-              <a:lumOff val="60000"/>
-            </a:schemeClr>
-          </a:solidFill>
-        </p:spPr>
-        <p:style>
-          <a:lnRef idx="2">
-            <a:schemeClr val="accent1">
-              <a:shade val="50000"/>
-            </a:schemeClr>
-          </a:lnRef>
-          <a:fillRef idx="1">
-            <a:schemeClr val="accent1"/>
-          </a:fillRef>
-          <a:effectRef idx="0">
-            <a:schemeClr val="accent1"/>
-          </a:effectRef>
-          <a:fontRef idx="minor">
-            <a:schemeClr val="lt1"/>
-          </a:fontRef>
-        </p:style>
-        <p:txBody>
-          <a:bodyPr rtlCol="0" anchor="ctr"/>
-          <a:lstStyle/>
-          <a:p>
-            <a:r>
-              <a:rPr lang="en-US" sz="2800" dirty="0">
-                <a:solidFill>
-                  <a:sysClr val="windowText" lastClr="000000"/>
-                </a:solidFill>
-              </a:rPr>
-              <a:t>Toggle</a:t>
-            </a:r>
-          </a:p>
-          <a:p>
-            <a:endParaRPr lang="en-US" sz="2800" dirty="0">
-              <a:solidFill>
-                <a:sysClr val="windowText" lastClr="000000"/>
-              </a:solidFill>
-            </a:endParaRPr>
-          </a:p>
-          <a:p>
-            <a:r>
-              <a:rPr lang="en-US" sz="2800" dirty="0">
-                <a:solidFill>
-                  <a:sysClr val="windowText" lastClr="000000"/>
-                </a:solidFill>
-              </a:rPr>
-              <a:t>search box</a:t>
-            </a:r>
-          </a:p>
-        </p:txBody>
-      </p:sp>
-      <p:sp>
-        <p:nvSpPr>
-          <p:cNvPr id="4" name="Rounded Rectangular Callout 3">
-            <a:extLst>
-              <a:ext uri="{FF2B5EF4-FFF2-40B4-BE49-F238E27FC236}">
-                <a16:creationId xmlns:a16="http://schemas.microsoft.com/office/drawing/2014/main" id="{6EBB775B-FFE8-A547-A748-1F9B08D9B0F5}"/>
-              </a:ext>
-            </a:extLst>
-          </p:cNvPr>
-          <p:cNvSpPr/>
-          <p:nvPr/>
-        </p:nvSpPr>
-        <p:spPr>
-          <a:xfrm>
-            <a:off x="7586663" y="1787206"/>
-            <a:ext cx="3343275" cy="827407"/>
-          </a:xfrm>
-          <a:prstGeom prst="wedgeRoundRectCallout">
-            <a:avLst>
-              <a:gd name="adj1" fmla="val -71107"/>
-              <a:gd name="adj2" fmla="val 24536"/>
-              <a:gd name="adj3" fmla="val 16667"/>
-            </a:avLst>
-          </a:prstGeom>
-          <a:solidFill>
-            <a:schemeClr val="accent6">
-              <a:lumMod val="75000"/>
-            </a:schemeClr>
-          </a:solidFill>
-        </p:spPr>
-        <p:style>
-          <a:lnRef idx="2">
-            <a:schemeClr val="accent1">
-              <a:shade val="50000"/>
-            </a:schemeClr>
-          </a:lnRef>
-          <a:fillRef idx="1">
-            <a:schemeClr val="accent1"/>
-          </a:fillRef>
-          <a:effectRef idx="0">
-            <a:schemeClr val="accent1"/>
-          </a:effectRef>
-          <a:fontRef idx="minor">
-            <a:schemeClr val="lt1"/>
-          </a:fontRef>
-        </p:style>
-        <p:txBody>
-          <a:bodyPr rtlCol="0" anchor="ctr"/>
-          <a:lstStyle/>
-          <a:p>
-            <a:r>
-              <a:rPr lang="en-US" sz="1600" dirty="0"/>
-              <a:t>Staycation Hotels &amp; SHN Hotels</a:t>
-            </a:r>
-          </a:p>
-          <a:p>
-            <a:r>
-              <a:rPr lang="en-US" sz="1600" dirty="0"/>
-              <a:t>Dengue Clusters</a:t>
-            </a:r>
-          </a:p>
-          <a:p>
-            <a:r>
-              <a:rPr lang="en-US" sz="1600" dirty="0"/>
-              <a:t>COVID-19 Clusters</a:t>
-            </a:r>
-          </a:p>
-        </p:txBody>
-      </p:sp>
-      <p:sp>
-        <p:nvSpPr>
-          <p:cNvPr id="5" name="Rounded Rectangular Callout 4">
-            <a:extLst>
-              <a:ext uri="{FF2B5EF4-FFF2-40B4-BE49-F238E27FC236}">
-                <a16:creationId xmlns:a16="http://schemas.microsoft.com/office/drawing/2014/main" id="{FC9377FF-720A-E04C-941E-347B967AEDE9}"/>
-              </a:ext>
-            </a:extLst>
-          </p:cNvPr>
-          <p:cNvSpPr/>
-          <p:nvPr/>
-        </p:nvSpPr>
-        <p:spPr>
-          <a:xfrm>
-            <a:off x="7586662" y="2844481"/>
-            <a:ext cx="3343276" cy="827407"/>
-          </a:xfrm>
-          <a:prstGeom prst="wedgeRoundRectCallout">
-            <a:avLst>
-              <a:gd name="adj1" fmla="val -70508"/>
-              <a:gd name="adj2" fmla="val 3814"/>
-              <a:gd name="adj3" fmla="val 16667"/>
-            </a:avLst>
-          </a:prstGeom>
-          <a:solidFill>
-            <a:schemeClr val="accent6">
-              <a:lumMod val="75000"/>
-            </a:schemeClr>
-          </a:solidFill>
-        </p:spPr>
-        <p:style>
-          <a:lnRef idx="2">
-            <a:schemeClr val="accent1">
-              <a:shade val="50000"/>
-            </a:schemeClr>
-          </a:lnRef>
-          <a:fillRef idx="1">
-            <a:schemeClr val="accent1"/>
-          </a:fillRef>
-          <a:effectRef idx="0">
-            <a:schemeClr val="accent1"/>
-          </a:effectRef>
-          <a:fontRef idx="minor">
-            <a:schemeClr val="lt1"/>
-          </a:fontRef>
-        </p:style>
-        <p:txBody>
-          <a:bodyPr rtlCol="0" anchor="ctr"/>
-          <a:lstStyle/>
-          <a:p>
-            <a:r>
-              <a:rPr lang="en-US" sz="1600" dirty="0"/>
-              <a:t>Search by name or postal code</a:t>
-            </a:r>
-          </a:p>
-          <a:p>
-            <a:r>
-              <a:rPr lang="en-US" sz="1600" dirty="0"/>
-              <a:t>Result: display the 3 indicators, name, address, 1 image</a:t>
-            </a:r>
-          </a:p>
-        </p:txBody>
-      </p:sp>
-      <p:sp>
-        <p:nvSpPr>
-          <p:cNvPr id="6" name="Rounded Rectangle 5">
-            <a:extLst>
-              <a:ext uri="{FF2B5EF4-FFF2-40B4-BE49-F238E27FC236}">
-                <a16:creationId xmlns:a16="http://schemas.microsoft.com/office/drawing/2014/main" id="{149C720F-A1EB-D54B-A0BE-A7FC0DBCF2A8}"/>
-              </a:ext>
-            </a:extLst>
-          </p:cNvPr>
-          <p:cNvSpPr/>
-          <p:nvPr/>
-        </p:nvSpPr>
-        <p:spPr>
-          <a:xfrm>
-            <a:off x="7586662" y="3857625"/>
-            <a:ext cx="3343276" cy="1343025"/>
-          </a:xfrm>
-          <a:prstGeom prst="roundRect">
-            <a:avLst/>
-          </a:prstGeom>
-          <a:solidFill>
-            <a:srgbClr val="7030A0"/>
-          </a:solidFill>
-        </p:spPr>
-        <p:style>
-          <a:lnRef idx="2">
-            <a:schemeClr val="accent1">
-              <a:shade val="50000"/>
-            </a:schemeClr>
-          </a:lnRef>
-          <a:fillRef idx="1">
-            <a:schemeClr val="accent1"/>
-          </a:fillRef>
-          <a:effectRef idx="0">
-            <a:schemeClr val="accent1"/>
-          </a:effectRef>
-          <a:fontRef idx="minor">
-            <a:schemeClr val="lt1"/>
-          </a:fontRef>
-        </p:style>
-        <p:txBody>
-          <a:bodyPr rtlCol="0" anchor="ctr"/>
-          <a:lstStyle/>
-          <a:p>
-            <a:r>
-              <a:rPr lang="en-US" sz="1600" dirty="0"/>
-              <a:t>Optional: </a:t>
-            </a:r>
-          </a:p>
-          <a:p>
-            <a:r>
-              <a:rPr lang="en-US" sz="1600" dirty="0"/>
-              <a:t>search by star rating, facilities, reviews</a:t>
-            </a:r>
-          </a:p>
-          <a:p>
-            <a:r>
-              <a:rPr lang="en-US" sz="1600" dirty="0"/>
-              <a:t>Results include short writeup, image carousel</a:t>
-            </a:r>
-          </a:p>
-        </p:txBody>
-      </p:sp>
+        </p:grpSpPr>
+        <p:sp>
+          <p:nvSpPr>
+            <p:cNvPr id="2" name="Rectangle 1">
+              <a:extLst>
+                <a:ext uri="{FF2B5EF4-FFF2-40B4-BE49-F238E27FC236}">
+                  <a16:creationId xmlns:a16="http://schemas.microsoft.com/office/drawing/2014/main" id="{505C5A59-FB7C-2749-9378-63C25D9835B0}"/>
+                </a:ext>
+              </a:extLst>
+            </p:cNvPr>
+            <p:cNvSpPr/>
+            <p:nvPr/>
+          </p:nvSpPr>
+          <p:spPr>
+            <a:xfrm>
+              <a:off x="272714" y="373427"/>
+              <a:ext cx="7990751" cy="924796"/>
+            </a:xfrm>
+            <a:prstGeom prst="rect">
+              <a:avLst/>
+            </a:prstGeom>
+            <a:solidFill>
+              <a:schemeClr val="accent1">
+                <a:lumMod val="20000"/>
+                <a:lumOff val="80000"/>
+              </a:schemeClr>
+            </a:solidFill>
+          </p:spPr>
+          <p:style>
+            <a:lnRef idx="2">
+              <a:schemeClr val="accent1">
+                <a:shade val="50000"/>
+              </a:schemeClr>
+            </a:lnRef>
+            <a:fillRef idx="1">
+              <a:schemeClr val="accent1"/>
+            </a:fillRef>
+            <a:effectRef idx="0">
+              <a:schemeClr val="accent1"/>
+            </a:effectRef>
+            <a:fontRef idx="minor">
+              <a:schemeClr val="lt1"/>
+            </a:fontRef>
+          </p:style>
+          <p:txBody>
+            <a:bodyPr rtlCol="0" anchor="ctr"/>
+            <a:lstStyle/>
+            <a:p>
+              <a:pPr algn="ctr">
+                <a:lnSpc>
+                  <a:spcPct val="150000"/>
+                </a:lnSpc>
+              </a:pPr>
+              <a:r>
+                <a:rPr lang="en-US" sz="1600" dirty="0" err="1">
+                  <a:solidFill>
+                    <a:sysClr val="windowText" lastClr="000000"/>
+                  </a:solidFill>
+                </a:rPr>
+                <a:t>Nav</a:t>
+              </a:r>
+              <a:r>
+                <a:rPr lang="en-US" sz="1600" dirty="0">
+                  <a:solidFill>
+                    <a:sysClr val="windowText" lastClr="000000"/>
+                  </a:solidFill>
+                </a:rPr>
+                <a:t> Bar</a:t>
+              </a:r>
+            </a:p>
+            <a:p>
+              <a:pPr>
+                <a:lnSpc>
+                  <a:spcPct val="150000"/>
+                </a:lnSpc>
+              </a:pPr>
+              <a:r>
+                <a:rPr lang="en-US" sz="1600" dirty="0">
+                  <a:solidFill>
+                    <a:sysClr val="windowText" lastClr="000000"/>
+                  </a:solidFill>
+                </a:rPr>
+                <a:t>Home                   How to Use                  About</a:t>
+              </a:r>
+            </a:p>
+          </p:txBody>
+        </p:sp>
+        <p:sp>
+          <p:nvSpPr>
+            <p:cNvPr id="7" name="Rectangle 6">
+              <a:extLst>
+                <a:ext uri="{FF2B5EF4-FFF2-40B4-BE49-F238E27FC236}">
+                  <a16:creationId xmlns:a16="http://schemas.microsoft.com/office/drawing/2014/main" id="{8D0291E0-08DE-024D-BF8B-13F89C0D1D2B}"/>
+                </a:ext>
+              </a:extLst>
+            </p:cNvPr>
+            <p:cNvSpPr/>
+            <p:nvPr/>
+          </p:nvSpPr>
+          <p:spPr>
+            <a:xfrm>
+              <a:off x="3402645" y="1298223"/>
+              <a:ext cx="1349978" cy="1072444"/>
+            </a:xfrm>
+            <a:prstGeom prst="rect">
+              <a:avLst/>
+            </a:prstGeom>
+            <a:solidFill>
+              <a:schemeClr val="accent1">
+                <a:lumMod val="20000"/>
+                <a:lumOff val="80000"/>
+              </a:schemeClr>
+            </a:solidFill>
+          </p:spPr>
+          <p:style>
+            <a:lnRef idx="2">
+              <a:schemeClr val="accent1">
+                <a:shade val="50000"/>
+              </a:schemeClr>
+            </a:lnRef>
+            <a:fillRef idx="1">
+              <a:schemeClr val="accent1"/>
+            </a:fillRef>
+            <a:effectRef idx="0">
+              <a:schemeClr val="accent1"/>
+            </a:effectRef>
+            <a:fontRef idx="minor">
+              <a:schemeClr val="lt1"/>
+            </a:fontRef>
+          </p:style>
+          <p:txBody>
+            <a:bodyPr rtlCol="0" anchor="ctr"/>
+            <a:lstStyle/>
+            <a:p>
+              <a:pPr>
+                <a:lnSpc>
+                  <a:spcPct val="150000"/>
+                </a:lnSpc>
+              </a:pPr>
+              <a:r>
+                <a:rPr lang="en-US" sz="1600" dirty="0">
+                  <a:solidFill>
+                    <a:sysClr val="windowText" lastClr="000000"/>
+                  </a:solidFill>
+                </a:rPr>
+                <a:t>Dengue Fever</a:t>
+              </a:r>
+            </a:p>
+            <a:p>
+              <a:pPr>
+                <a:lnSpc>
+                  <a:spcPct val="150000"/>
+                </a:lnSpc>
+              </a:pPr>
+              <a:r>
+                <a:rPr lang="en-US" sz="1600" dirty="0">
+                  <a:solidFill>
+                    <a:sysClr val="windowText" lastClr="000000"/>
+                  </a:solidFill>
+                </a:rPr>
+                <a:t>COVID-19</a:t>
+              </a:r>
+            </a:p>
+            <a:p>
+              <a:pPr>
+                <a:lnSpc>
+                  <a:spcPct val="150000"/>
+                </a:lnSpc>
+              </a:pPr>
+              <a:r>
+                <a:rPr lang="en-US" sz="1600" dirty="0">
+                  <a:solidFill>
+                    <a:sysClr val="windowText" lastClr="000000"/>
+                  </a:solidFill>
+                </a:rPr>
+                <a:t>Data Sources</a:t>
+              </a:r>
+            </a:p>
+          </p:txBody>
+        </p:sp>
+      </p:grpSp>
     </p:spTree>
     <p:extLst>
       <p:ext uri="{BB962C8B-B14F-4D97-AF65-F5344CB8AC3E}">
         <p14:creationId xmlns:p14="http://schemas.microsoft.com/office/powerpoint/2010/main" val="1672051336"/>
-      </p:ext>
-    </p:extLst>
-  </p:cSld>
-  <p:clrMapOvr>
-    <a:masterClrMapping/>
-  </p:clrMapOvr>
-</p:sld>
-</file>
-
-<file path=ppt/slides/slide3.xml><?xml version="1.0" encoding="utf-8"?>
-<p:sld xmlns:a="http://schemas.openxmlformats.org/drawingml/2006/main" xmlns:r="http://schemas.openxmlformats.org/officeDocument/2006/relationships" xmlns:p="http://schemas.openxmlformats.org/presentationml/2006/main">
-  <p:cSld>
-    <p:spTree>
-      <p:nvGrpSpPr>
-        <p:cNvPr id="1" name=""/>
-        <p:cNvGrpSpPr/>
-        <p:nvPr/>
-      </p:nvGrpSpPr>
-      <p:grpSpPr>
-        <a:xfrm>
-          <a:off x="0" y="0"/>
-          <a:ext cx="0" cy="0"/>
-          <a:chOff x="0" y="0"/>
-          <a:chExt cx="0" cy="0"/>
-        </a:xfrm>
-      </p:grpSpPr>
-    </p:spTree>
-    <p:extLst>
-      <p:ext uri="{BB962C8B-B14F-4D97-AF65-F5344CB8AC3E}">
-        <p14:creationId xmlns:p14="http://schemas.microsoft.com/office/powerpoint/2010/main" val="1480946870"/>
-      </p:ext>
-    </p:extLst>
-  </p:cSld>
-  <p:clrMapOvr>
-    <a:masterClrMapping/>
-  </p:clrMapOvr>
-</p:sld>
-</file>
-
-<file path=ppt/slides/slide4.xml><?xml version="1.0" encoding="utf-8"?>
-<p:sld xmlns:a="http://schemas.openxmlformats.org/drawingml/2006/main" xmlns:r="http://schemas.openxmlformats.org/officeDocument/2006/relationships" xmlns:p="http://schemas.openxmlformats.org/presentationml/2006/main">
-  <p:cSld>
-    <p:spTree>
-      <p:nvGrpSpPr>
-        <p:cNvPr id="1" name=""/>
-        <p:cNvGrpSpPr/>
-        <p:nvPr/>
-      </p:nvGrpSpPr>
-      <p:grpSpPr>
-        <a:xfrm>
-          <a:off x="0" y="0"/>
-          <a:ext cx="0" cy="0"/>
-          <a:chOff x="0" y="0"/>
-          <a:chExt cx="0" cy="0"/>
-        </a:xfrm>
-      </p:grpSpPr>
-      <p:sp>
-        <p:nvSpPr>
-          <p:cNvPr id="2" name="Title 1">
-            <a:extLst>
-              <a:ext uri="{FF2B5EF4-FFF2-40B4-BE49-F238E27FC236}">
-                <a16:creationId xmlns:a16="http://schemas.microsoft.com/office/drawing/2014/main" id="{C6EABB0C-7769-9249-8C11-3370B43FC278}"/>
-              </a:ext>
-            </a:extLst>
-          </p:cNvPr>
-          <p:cNvSpPr>
-            <a:spLocks noGrp="1"/>
-          </p:cNvSpPr>
-          <p:nvPr>
-            <p:ph type="title"/>
-          </p:nvPr>
-        </p:nvSpPr>
-        <p:spPr>
-          <a:xfrm>
-            <a:off x="838200" y="365125"/>
-            <a:ext cx="10515600" cy="606425"/>
-          </a:xfrm>
-        </p:spPr>
-        <p:txBody>
-          <a:bodyPr>
-            <a:normAutofit fontScale="90000"/>
-          </a:bodyPr>
-          <a:lstStyle/>
-          <a:p>
-            <a:r>
-              <a:rPr lang="en-US" dirty="0"/>
-              <a:t>Attributions </a:t>
-            </a:r>
-          </a:p>
-        </p:txBody>
-      </p:sp>
-      <p:sp>
-        <p:nvSpPr>
-          <p:cNvPr id="4" name="Content Placeholder 3">
-            <a:extLst>
-              <a:ext uri="{FF2B5EF4-FFF2-40B4-BE49-F238E27FC236}">
-                <a16:creationId xmlns:a16="http://schemas.microsoft.com/office/drawing/2014/main" id="{6ED72EDA-74C3-2E43-BDBB-7D6023F44F8F}"/>
-              </a:ext>
-            </a:extLst>
-          </p:cNvPr>
-          <p:cNvSpPr>
-            <a:spLocks noGrp="1"/>
-          </p:cNvSpPr>
-          <p:nvPr>
-            <p:ph idx="1"/>
-          </p:nvPr>
-        </p:nvSpPr>
-        <p:spPr>
-          <a:xfrm>
-            <a:off x="838200" y="1100138"/>
-            <a:ext cx="10515600" cy="5076825"/>
-          </a:xfrm>
-        </p:spPr>
-        <p:txBody>
-          <a:bodyPr/>
-          <a:lstStyle/>
-          <a:p>
-            <a:r>
-              <a:rPr lang="en-US" dirty="0">
-                <a:hlinkClick r:id="rId2"/>
-              </a:rPr>
-              <a:t>https://icons8.com/</a:t>
-            </a:r>
-            <a:endParaRPr lang="en-US" dirty="0"/>
-          </a:p>
-          <a:p>
-            <a:r>
-              <a:rPr lang="en-US" dirty="0"/>
-              <a:t>&lt;a target="_blank" </a:t>
-            </a:r>
-            <a:r>
-              <a:rPr lang="en-US" dirty="0" err="1"/>
-              <a:t>href</a:t>
-            </a:r>
-            <a:r>
-              <a:rPr lang="en-US" dirty="0"/>
-              <a:t>="https://icons8.com/icon/31928/holiday"&gt;Holiday&lt;/a&gt; icon by &lt;a target="_blank" </a:t>
-            </a:r>
-            <a:r>
-              <a:rPr lang="en-US" dirty="0" err="1"/>
-              <a:t>href</a:t>
-            </a:r>
-            <a:r>
-              <a:rPr lang="en-US" dirty="0"/>
-              <a:t>="https://icons8.com"&gt;Icons8&lt;/a&gt;</a:t>
-            </a:r>
-          </a:p>
-          <a:p>
-            <a:r>
-              <a:rPr lang="en-US" dirty="0">
-                <a:hlinkClick r:id="rId3"/>
-              </a:rPr>
-              <a:t>https://www.npmjs.com/package/xml-js</a:t>
-            </a:r>
-            <a:endParaRPr lang="en-US" dirty="0"/>
-          </a:p>
-          <a:p>
-            <a:r>
-              <a:rPr lang="en-SG" dirty="0"/>
-              <a:t>Ensure that Powered </a:t>
-            </a:r>
-            <a:r>
-              <a:rPr lang="en-SG" dirty="0" err="1"/>
-              <a:t>by</a:t>
-            </a:r>
-            <a:r>
-              <a:rPr lang="en-SG" dirty="0" err="1">
-                <a:hlinkClick r:id="rId4"/>
-              </a:rPr>
-              <a:t>Esri</a:t>
-            </a:r>
-            <a:r>
-              <a:rPr lang="en-SG" dirty="0"/>
-              <a:t> is displayed in the map attribution</a:t>
-            </a:r>
-          </a:p>
-          <a:p>
-            <a:r>
-              <a:rPr lang="en-US" dirty="0">
-                <a:hlinkClick r:id="rId5"/>
-              </a:rPr>
-              <a:t>https://github.com/Esri/esri</a:t>
-            </a:r>
-            <a:r>
-              <a:rPr lang="en-US">
-                <a:hlinkClick r:id="rId5"/>
-              </a:rPr>
-              <a:t>-leaflet-geocoder</a:t>
-            </a:r>
-            <a:r>
-              <a:rPr lang="en-US"/>
-              <a:t> </a:t>
-            </a:r>
-          </a:p>
-          <a:p>
-            <a:endParaRPr lang="en-US" dirty="0"/>
-          </a:p>
-          <a:p>
-            <a:endParaRPr lang="en-US" dirty="0"/>
-          </a:p>
-        </p:txBody>
-      </p:sp>
-    </p:spTree>
-    <p:extLst>
-      <p:ext uri="{BB962C8B-B14F-4D97-AF65-F5344CB8AC3E}">
-        <p14:creationId xmlns:p14="http://schemas.microsoft.com/office/powerpoint/2010/main" val="4073428109"/>
       </p:ext>
     </p:extLst>
   </p:cSld>

</xml_diff>